<commit_message>
SQL Day 2019 (v4)
</commit_message>
<xml_diff>
--- a/SQLDay2019/SQLDay2019_PartitioningInBigDataSolutions.pptx
+++ b/SQLDay2019/SQLDay2019_PartitioningInBigDataSolutions.pptx
@@ -246,7 +246,7 @@
           <a:p>
             <a:fld id="{48B9CA49-2710-433E-ABB8-A4798B0CF6D4}" type="datetimeFigureOut">
               <a:rPr lang="en-US" smtClean="0"/>
-              <a:t>5/13/2019</a:t>
+              <a:t>5/15/2019</a:t>
             </a:fld>
             <a:endParaRPr lang="en-US"/>
           </a:p>
@@ -412,7 +412,7 @@
             <a:fld id="{21FB4422-3DC8-45BE-B0A0-D87D16501A8D}" type="datetimeFigureOut">
               <a:rPr lang="en-US" smtClean="0"/>
               <a:pPr/>
-              <a:t>5/13/2019</a:t>
+              <a:t>5/15/2019</a:t>
             </a:fld>
             <a:endParaRPr lang="en-US" dirty="0"/>
           </a:p>
@@ -770,6 +770,566 @@
 </p:notes>
 </file>
 
+<file path=ppt/notesSlides/notesSlide10.xml><?xml version="1.0" encoding="utf-8"?>
+<p:notes xmlns:a="http://schemas.openxmlformats.org/drawingml/2006/main" xmlns:r="http://schemas.openxmlformats.org/officeDocument/2006/relationships" xmlns:p="http://schemas.openxmlformats.org/presentationml/2006/main">
+  <p:cSld>
+    <p:spTree>
+      <p:nvGrpSpPr>
+        <p:cNvPr id="1" name=""/>
+        <p:cNvGrpSpPr/>
+        <p:nvPr/>
+      </p:nvGrpSpPr>
+      <p:grpSpPr>
+        <a:xfrm>
+          <a:off x="0" y="0"/>
+          <a:ext cx="0" cy="0"/>
+          <a:chOff x="0" y="0"/>
+          <a:chExt cx="0" cy="0"/>
+        </a:xfrm>
+      </p:grpSpPr>
+      <p:sp>
+        <p:nvSpPr>
+          <p:cNvPr id="2" name="Slide Image Placeholder 1"/>
+          <p:cNvSpPr>
+            <a:spLocks noGrp="1" noRot="1" noChangeAspect="1"/>
+          </p:cNvSpPr>
+          <p:nvPr>
+            <p:ph type="sldImg"/>
+          </p:nvPr>
+        </p:nvSpPr>
+        <p:spPr>
+          <a:xfrm>
+            <a:off x="1143000" y="685800"/>
+            <a:ext cx="4572000" cy="3429000"/>
+          </a:xfrm>
+        </p:spPr>
+      </p:sp>
+      <p:sp>
+        <p:nvSpPr>
+          <p:cNvPr id="3" name="Notes Placeholder 2"/>
+          <p:cNvSpPr>
+            <a:spLocks noGrp="1"/>
+          </p:cNvSpPr>
+          <p:nvPr>
+            <p:ph type="body" idx="1"/>
+          </p:nvPr>
+        </p:nvSpPr>
+        <p:spPr/>
+        <p:txBody>
+          <a:bodyPr/>
+          <a:lstStyle/>
+          <a:p>
+            <a:r>
+              <a:rPr lang="en-GB" dirty="0"/>
+              <a:t>Snappy Google -1 Thread</a:t>
+            </a:r>
+            <a:endParaRPr lang="pl-PL" dirty="0"/>
+          </a:p>
+        </p:txBody>
+      </p:sp>
+      <p:sp>
+        <p:nvSpPr>
+          <p:cNvPr id="4" name="Slide Number Placeholder 3"/>
+          <p:cNvSpPr>
+            <a:spLocks noGrp="1"/>
+          </p:cNvSpPr>
+          <p:nvPr>
+            <p:ph type="sldNum" sz="quarter" idx="5"/>
+          </p:nvPr>
+        </p:nvSpPr>
+        <p:spPr/>
+        <p:txBody>
+          <a:bodyPr/>
+          <a:lstStyle/>
+          <a:p>
+            <a:fld id="{CE9B941C-C958-4D16-B65B-3FFA13E93F71}" type="slidenum">
+              <a:rPr lang="en-US" smtClean="0"/>
+              <a:pPr/>
+              <a:t>20</a:t>
+            </a:fld>
+            <a:endParaRPr lang="en-US" dirty="0"/>
+          </a:p>
+        </p:txBody>
+      </p:sp>
+    </p:spTree>
+    <p:extLst>
+      <p:ext uri="{BB962C8B-B14F-4D97-AF65-F5344CB8AC3E}">
+        <p14:creationId xmlns:p14="http://schemas.microsoft.com/office/powerpoint/2010/main" val="2574177285"/>
+      </p:ext>
+    </p:extLst>
+  </p:cSld>
+  <p:clrMapOvr>
+    <a:masterClrMapping/>
+  </p:clrMapOvr>
+</p:notes>
+</file>
+
+<file path=ppt/notesSlides/notesSlide11.xml><?xml version="1.0" encoding="utf-8"?>
+<p:notes xmlns:a="http://schemas.openxmlformats.org/drawingml/2006/main" xmlns:r="http://schemas.openxmlformats.org/officeDocument/2006/relationships" xmlns:p="http://schemas.openxmlformats.org/presentationml/2006/main">
+  <p:cSld>
+    <p:spTree>
+      <p:nvGrpSpPr>
+        <p:cNvPr id="1" name=""/>
+        <p:cNvGrpSpPr/>
+        <p:nvPr/>
+      </p:nvGrpSpPr>
+      <p:grpSpPr>
+        <a:xfrm>
+          <a:off x="0" y="0"/>
+          <a:ext cx="0" cy="0"/>
+          <a:chOff x="0" y="0"/>
+          <a:chExt cx="0" cy="0"/>
+        </a:xfrm>
+      </p:grpSpPr>
+      <p:sp>
+        <p:nvSpPr>
+          <p:cNvPr id="2" name="Slide Image Placeholder 1"/>
+          <p:cNvSpPr>
+            <a:spLocks noGrp="1" noRot="1" noChangeAspect="1"/>
+          </p:cNvSpPr>
+          <p:nvPr>
+            <p:ph type="sldImg"/>
+          </p:nvPr>
+        </p:nvSpPr>
+        <p:spPr/>
+      </p:sp>
+      <p:sp>
+        <p:nvSpPr>
+          <p:cNvPr id="3" name="Notes Placeholder 2"/>
+          <p:cNvSpPr>
+            <a:spLocks noGrp="1"/>
+          </p:cNvSpPr>
+          <p:nvPr>
+            <p:ph type="body" idx="1"/>
+          </p:nvPr>
+        </p:nvSpPr>
+        <p:spPr/>
+        <p:txBody>
+          <a:bodyPr/>
+          <a:lstStyle/>
+          <a:p>
+            <a:r>
+              <a:rPr lang="en-GB" dirty="0"/>
+              <a:t>How to load data into managed partitioned tables.</a:t>
+            </a:r>
+          </a:p>
+          <a:p>
+            <a:r>
+              <a:rPr lang="en-US" sz="1200" b="0" i="0" kern="1200" dirty="0">
+                <a:solidFill>
+                  <a:schemeClr val="tx1"/>
+                </a:solidFill>
+                <a:effectLst/>
+                <a:latin typeface="+mn-lt"/>
+                <a:ea typeface="+mn-ea"/>
+                <a:cs typeface="+mn-cs"/>
+              </a:rPr>
+              <a:t> </a:t>
+            </a:r>
+            <a:r>
+              <a:rPr lang="en-US" sz="1200" b="1" i="0" kern="1200" dirty="0">
+                <a:solidFill>
+                  <a:schemeClr val="tx1"/>
+                </a:solidFill>
+                <a:effectLst/>
+                <a:latin typeface="+mn-lt"/>
+                <a:ea typeface="+mn-ea"/>
+                <a:cs typeface="+mn-cs"/>
+              </a:rPr>
+              <a:t>LOAD DATA</a:t>
+            </a:r>
+            <a:r>
+              <a:rPr lang="en-US" sz="1200" b="0" i="0" kern="1200" dirty="0">
+                <a:solidFill>
+                  <a:schemeClr val="tx1"/>
+                </a:solidFill>
+                <a:effectLst/>
+                <a:latin typeface="+mn-lt"/>
+                <a:ea typeface="+mn-ea"/>
+                <a:cs typeface="+mn-cs"/>
+              </a:rPr>
+              <a:t> INPATH '/user/</a:t>
+            </a:r>
+            <a:r>
+              <a:rPr lang="en-US" sz="1200" b="0" i="0" kern="1200" dirty="0" err="1">
+                <a:solidFill>
+                  <a:schemeClr val="tx1"/>
+                </a:solidFill>
+                <a:effectLst/>
+                <a:latin typeface="+mn-lt"/>
+                <a:ea typeface="+mn-ea"/>
+                <a:cs typeface="+mn-cs"/>
+              </a:rPr>
+              <a:t>myname</a:t>
+            </a:r>
+            <a:r>
+              <a:rPr lang="en-US" sz="1200" b="0" i="0" kern="1200" dirty="0">
+                <a:solidFill>
+                  <a:schemeClr val="tx1"/>
+                </a:solidFill>
+                <a:effectLst/>
+                <a:latin typeface="+mn-lt"/>
+                <a:ea typeface="+mn-ea"/>
+                <a:cs typeface="+mn-cs"/>
+              </a:rPr>
+              <a:t>/kv2.txt' OVERWRITE INTO TABLE invites </a:t>
+            </a:r>
+            <a:r>
+              <a:rPr lang="en-US" sz="1200" b="1" i="0" kern="1200" dirty="0">
+                <a:solidFill>
+                  <a:schemeClr val="tx1"/>
+                </a:solidFill>
+                <a:effectLst/>
+                <a:latin typeface="+mn-lt"/>
+                <a:ea typeface="+mn-ea"/>
+                <a:cs typeface="+mn-cs"/>
+              </a:rPr>
+              <a:t>PARTITION</a:t>
+            </a:r>
+            <a:r>
+              <a:rPr lang="en-US" sz="1200" b="0" i="0" kern="1200" dirty="0">
+                <a:solidFill>
+                  <a:schemeClr val="tx1"/>
+                </a:solidFill>
+                <a:effectLst/>
+                <a:latin typeface="+mn-lt"/>
+                <a:ea typeface="+mn-ea"/>
+                <a:cs typeface="+mn-cs"/>
+              </a:rPr>
+              <a:t> (ds='2008-08-15');</a:t>
+            </a:r>
+            <a:endParaRPr lang="pl-PL" dirty="0"/>
+          </a:p>
+        </p:txBody>
+      </p:sp>
+      <p:sp>
+        <p:nvSpPr>
+          <p:cNvPr id="4" name="Slide Number Placeholder 3"/>
+          <p:cNvSpPr>
+            <a:spLocks noGrp="1"/>
+          </p:cNvSpPr>
+          <p:nvPr>
+            <p:ph type="sldNum" sz="quarter" idx="5"/>
+          </p:nvPr>
+        </p:nvSpPr>
+        <p:spPr/>
+        <p:txBody>
+          <a:bodyPr/>
+          <a:lstStyle/>
+          <a:p>
+            <a:fld id="{CE9B941C-C958-4D16-B65B-3FFA13E93F71}" type="slidenum">
+              <a:rPr lang="en-US" smtClean="0"/>
+              <a:pPr/>
+              <a:t>21</a:t>
+            </a:fld>
+            <a:endParaRPr lang="en-US" dirty="0"/>
+          </a:p>
+        </p:txBody>
+      </p:sp>
+    </p:spTree>
+    <p:extLst>
+      <p:ext uri="{BB962C8B-B14F-4D97-AF65-F5344CB8AC3E}">
+        <p14:creationId xmlns:p14="http://schemas.microsoft.com/office/powerpoint/2010/main" val="169202429"/>
+      </p:ext>
+    </p:extLst>
+  </p:cSld>
+  <p:clrMapOvr>
+    <a:masterClrMapping/>
+  </p:clrMapOvr>
+</p:notes>
+</file>
+
+<file path=ppt/notesSlides/notesSlide12.xml><?xml version="1.0" encoding="utf-8"?>
+<p:notes xmlns:a="http://schemas.openxmlformats.org/drawingml/2006/main" xmlns:r="http://schemas.openxmlformats.org/officeDocument/2006/relationships" xmlns:p="http://schemas.openxmlformats.org/presentationml/2006/main">
+  <p:cSld>
+    <p:spTree>
+      <p:nvGrpSpPr>
+        <p:cNvPr id="1" name=""/>
+        <p:cNvGrpSpPr/>
+        <p:nvPr/>
+      </p:nvGrpSpPr>
+      <p:grpSpPr>
+        <a:xfrm>
+          <a:off x="0" y="0"/>
+          <a:ext cx="0" cy="0"/>
+          <a:chOff x="0" y="0"/>
+          <a:chExt cx="0" cy="0"/>
+        </a:xfrm>
+      </p:grpSpPr>
+      <p:sp>
+        <p:nvSpPr>
+          <p:cNvPr id="2" name="Slide Image Placeholder 1"/>
+          <p:cNvSpPr>
+            <a:spLocks noGrp="1" noRot="1" noChangeAspect="1"/>
+          </p:cNvSpPr>
+          <p:nvPr>
+            <p:ph type="sldImg"/>
+          </p:nvPr>
+        </p:nvSpPr>
+        <p:spPr/>
+      </p:sp>
+      <p:sp>
+        <p:nvSpPr>
+          <p:cNvPr id="3" name="Notes Placeholder 2"/>
+          <p:cNvSpPr>
+            <a:spLocks noGrp="1"/>
+          </p:cNvSpPr>
+          <p:nvPr>
+            <p:ph type="body" idx="1"/>
+          </p:nvPr>
+        </p:nvSpPr>
+        <p:spPr/>
+        <p:txBody>
+          <a:bodyPr/>
+          <a:lstStyle/>
+          <a:p>
+            <a:r>
+              <a:rPr lang="en-US" dirty="0" err="1"/>
+              <a:t>spark.sql.sources.bucketing.enabled</a:t>
+            </a:r>
+            <a:endParaRPr lang="pl-PL" dirty="0"/>
+          </a:p>
+        </p:txBody>
+      </p:sp>
+      <p:sp>
+        <p:nvSpPr>
+          <p:cNvPr id="4" name="Slide Number Placeholder 3"/>
+          <p:cNvSpPr>
+            <a:spLocks noGrp="1"/>
+          </p:cNvSpPr>
+          <p:nvPr>
+            <p:ph type="sldNum" sz="quarter" idx="5"/>
+          </p:nvPr>
+        </p:nvSpPr>
+        <p:spPr/>
+        <p:txBody>
+          <a:bodyPr/>
+          <a:lstStyle/>
+          <a:p>
+            <a:fld id="{CE9B941C-C958-4D16-B65B-3FFA13E93F71}" type="slidenum">
+              <a:rPr lang="en-US" smtClean="0"/>
+              <a:pPr/>
+              <a:t>25</a:t>
+            </a:fld>
+            <a:endParaRPr lang="en-US" dirty="0"/>
+          </a:p>
+        </p:txBody>
+      </p:sp>
+    </p:spTree>
+    <p:extLst>
+      <p:ext uri="{BB962C8B-B14F-4D97-AF65-F5344CB8AC3E}">
+        <p14:creationId xmlns:p14="http://schemas.microsoft.com/office/powerpoint/2010/main" val="1921487644"/>
+      </p:ext>
+    </p:extLst>
+  </p:cSld>
+  <p:clrMapOvr>
+    <a:masterClrMapping/>
+  </p:clrMapOvr>
+</p:notes>
+</file>
+
+<file path=ppt/notesSlides/notesSlide13.xml><?xml version="1.0" encoding="utf-8"?>
+<p:notes xmlns:a="http://schemas.openxmlformats.org/drawingml/2006/main" xmlns:r="http://schemas.openxmlformats.org/officeDocument/2006/relationships" xmlns:p="http://schemas.openxmlformats.org/presentationml/2006/main">
+  <p:cSld>
+    <p:spTree>
+      <p:nvGrpSpPr>
+        <p:cNvPr id="1" name=""/>
+        <p:cNvGrpSpPr/>
+        <p:nvPr/>
+      </p:nvGrpSpPr>
+      <p:grpSpPr>
+        <a:xfrm>
+          <a:off x="0" y="0"/>
+          <a:ext cx="0" cy="0"/>
+          <a:chOff x="0" y="0"/>
+          <a:chExt cx="0" cy="0"/>
+        </a:xfrm>
+      </p:grpSpPr>
+      <p:sp>
+        <p:nvSpPr>
+          <p:cNvPr id="2" name="Slide Image Placeholder 1"/>
+          <p:cNvSpPr>
+            <a:spLocks noGrp="1" noRot="1" noChangeAspect="1"/>
+          </p:cNvSpPr>
+          <p:nvPr>
+            <p:ph type="sldImg"/>
+          </p:nvPr>
+        </p:nvSpPr>
+        <p:spPr/>
+      </p:sp>
+      <p:sp>
+        <p:nvSpPr>
+          <p:cNvPr id="3" name="Notes Placeholder 2"/>
+          <p:cNvSpPr>
+            <a:spLocks noGrp="1"/>
+          </p:cNvSpPr>
+          <p:nvPr>
+            <p:ph type="body" idx="1"/>
+          </p:nvPr>
+        </p:nvSpPr>
+        <p:spPr/>
+        <p:txBody>
+          <a:bodyPr/>
+          <a:lstStyle/>
+          <a:p>
+            <a:r>
+              <a:rPr lang="en-GB" dirty="0"/>
+              <a:t>Problems with data lake</a:t>
+            </a:r>
+          </a:p>
+          <a:p>
+            <a:r>
+              <a:rPr lang="en-GB" dirty="0"/>
+              <a:t>Dirty data</a:t>
+            </a:r>
+          </a:p>
+          <a:p>
+            <a:r>
+              <a:rPr lang="en-GB" dirty="0"/>
+              <a:t>2 paths in Lambda </a:t>
+            </a:r>
+            <a:r>
+              <a:rPr lang="en-GB" dirty="0" err="1"/>
+              <a:t>architecure</a:t>
+            </a:r>
+            <a:endParaRPr lang="en-GB" dirty="0"/>
+          </a:p>
+          <a:p>
+            <a:r>
+              <a:rPr lang="en-GB" dirty="0"/>
+              <a:t>Problems with Update Data</a:t>
+            </a:r>
+            <a:endParaRPr lang="pl-PL" dirty="0"/>
+          </a:p>
+        </p:txBody>
+      </p:sp>
+      <p:sp>
+        <p:nvSpPr>
+          <p:cNvPr id="4" name="Slide Number Placeholder 3"/>
+          <p:cNvSpPr>
+            <a:spLocks noGrp="1"/>
+          </p:cNvSpPr>
+          <p:nvPr>
+            <p:ph type="sldNum" sz="quarter" idx="5"/>
+          </p:nvPr>
+        </p:nvSpPr>
+        <p:spPr/>
+        <p:txBody>
+          <a:bodyPr/>
+          <a:lstStyle/>
+          <a:p>
+            <a:fld id="{CE9B941C-C958-4D16-B65B-3FFA13E93F71}" type="slidenum">
+              <a:rPr lang="en-US" smtClean="0"/>
+              <a:pPr/>
+              <a:t>28</a:t>
+            </a:fld>
+            <a:endParaRPr lang="en-US" dirty="0"/>
+          </a:p>
+        </p:txBody>
+      </p:sp>
+    </p:spTree>
+    <p:extLst>
+      <p:ext uri="{BB962C8B-B14F-4D97-AF65-F5344CB8AC3E}">
+        <p14:creationId xmlns:p14="http://schemas.microsoft.com/office/powerpoint/2010/main" val="3060320078"/>
+      </p:ext>
+    </p:extLst>
+  </p:cSld>
+  <p:clrMapOvr>
+    <a:masterClrMapping/>
+  </p:clrMapOvr>
+</p:notes>
+</file>
+
+<file path=ppt/notesSlides/notesSlide14.xml><?xml version="1.0" encoding="utf-8"?>
+<p:notes xmlns:a="http://schemas.openxmlformats.org/drawingml/2006/main" xmlns:r="http://schemas.openxmlformats.org/officeDocument/2006/relationships" xmlns:p="http://schemas.openxmlformats.org/presentationml/2006/main">
+  <p:cSld>
+    <p:spTree>
+      <p:nvGrpSpPr>
+        <p:cNvPr id="1" name=""/>
+        <p:cNvGrpSpPr/>
+        <p:nvPr/>
+      </p:nvGrpSpPr>
+      <p:grpSpPr>
+        <a:xfrm>
+          <a:off x="0" y="0"/>
+          <a:ext cx="0" cy="0"/>
+          <a:chOff x="0" y="0"/>
+          <a:chExt cx="0" cy="0"/>
+        </a:xfrm>
+      </p:grpSpPr>
+      <p:sp>
+        <p:nvSpPr>
+          <p:cNvPr id="2" name="Symbol zastępczy obrazu slajdu 1"/>
+          <p:cNvSpPr>
+            <a:spLocks noGrp="1" noRot="1" noChangeAspect="1"/>
+          </p:cNvSpPr>
+          <p:nvPr>
+            <p:ph type="sldImg"/>
+          </p:nvPr>
+        </p:nvSpPr>
+        <p:spPr>
+          <a:xfrm>
+            <a:off x="1143000" y="685800"/>
+            <a:ext cx="4572000" cy="3429000"/>
+          </a:xfrm>
+        </p:spPr>
+      </p:sp>
+      <p:sp>
+        <p:nvSpPr>
+          <p:cNvPr id="3" name="Symbol zastępczy notatek 2"/>
+          <p:cNvSpPr>
+            <a:spLocks noGrp="1"/>
+          </p:cNvSpPr>
+          <p:nvPr>
+            <p:ph type="body" idx="1"/>
+          </p:nvPr>
+        </p:nvSpPr>
+        <p:spPr/>
+        <p:txBody>
+          <a:bodyPr/>
+          <a:lstStyle/>
+          <a:p>
+            <a:endParaRPr lang="pl-PL"/>
+          </a:p>
+        </p:txBody>
+      </p:sp>
+      <p:sp>
+        <p:nvSpPr>
+          <p:cNvPr id="4" name="Symbol zastępczy numeru slajdu 3"/>
+          <p:cNvSpPr>
+            <a:spLocks noGrp="1"/>
+          </p:cNvSpPr>
+          <p:nvPr>
+            <p:ph type="sldNum" sz="quarter" idx="10"/>
+          </p:nvPr>
+        </p:nvSpPr>
+        <p:spPr/>
+        <p:txBody>
+          <a:bodyPr/>
+          <a:lstStyle/>
+          <a:p>
+            <a:fld id="{CE9B941C-C958-4D16-B65B-3FFA13E93F71}" type="slidenum">
+              <a:rPr lang="en-US" smtClean="0"/>
+              <a:pPr/>
+              <a:t>33</a:t>
+            </a:fld>
+            <a:endParaRPr lang="en-US" dirty="0"/>
+          </a:p>
+        </p:txBody>
+      </p:sp>
+    </p:spTree>
+    <p:extLst>
+      <p:ext uri="{BB962C8B-B14F-4D97-AF65-F5344CB8AC3E}">
+        <p14:creationId xmlns:p14="http://schemas.microsoft.com/office/powerpoint/2010/main" val="4248993471"/>
+      </p:ext>
+    </p:extLst>
+  </p:cSld>
+  <p:clrMapOvr>
+    <a:masterClrMapping/>
+  </p:clrMapOvr>
+</p:notes>
+</file>
+
 <file path=ppt/notesSlides/notesSlide2.xml><?xml version="1.0" encoding="utf-8"?>
 <p:notes xmlns:a="http://schemas.openxmlformats.org/drawingml/2006/main" xmlns:r="http://schemas.openxmlformats.org/officeDocument/2006/relationships" xmlns:p="http://schemas.openxmlformats.org/presentationml/2006/main">
   <p:cSld>
@@ -887,12 +1447,7 @@
             <p:ph type="sldImg"/>
           </p:nvPr>
         </p:nvSpPr>
-        <p:spPr>
-          <a:xfrm>
-            <a:off x="1143000" y="685800"/>
-            <a:ext cx="4572000" cy="3429000"/>
-          </a:xfrm>
-        </p:spPr>
+        <p:spPr/>
       </p:sp>
       <p:sp>
         <p:nvSpPr>
@@ -911,7 +1466,11 @@
           <a:p>
             <a:r>
               <a:rPr lang="en-GB" dirty="0"/>
-              <a:t>Snappy Google -1 Thread</a:t>
+              <a:t>System </a:t>
+            </a:r>
+            <a:r>
+              <a:rPr lang="en-GB" dirty="0" err="1"/>
+              <a:t>paszportowy</a:t>
             </a:r>
             <a:endParaRPr lang="pl-PL" dirty="0"/>
           </a:p>
@@ -935,7 +1494,7 @@
             <a:fld id="{CE9B941C-C958-4D16-B65B-3FFA13E93F71}" type="slidenum">
               <a:rPr lang="en-US" smtClean="0"/>
               <a:pPr/>
-              <a:t>20</a:t>
+              <a:t>3</a:t>
             </a:fld>
             <a:endParaRPr lang="en-US" dirty="0"/>
           </a:p>
@@ -944,7 +1503,7 @@
     </p:spTree>
     <p:extLst>
       <p:ext uri="{BB962C8B-B14F-4D97-AF65-F5344CB8AC3E}">
-        <p14:creationId xmlns:p14="http://schemas.microsoft.com/office/powerpoint/2010/main" val="2574177285"/>
+        <p14:creationId xmlns:p14="http://schemas.microsoft.com/office/powerpoint/2010/main" val="1505202386"/>
       </p:ext>
     </p:extLst>
   </p:cSld>
@@ -973,7 +1532,7 @@
       </p:grpSpPr>
       <p:sp>
         <p:nvSpPr>
-          <p:cNvPr id="2" name="Symbol zastępczy obrazu slajdu 1"/>
+          <p:cNvPr id="2" name="Slide Image Placeholder 1"/>
           <p:cNvSpPr>
             <a:spLocks noGrp="1" noRot="1" noChangeAspect="1"/>
           </p:cNvSpPr>
@@ -981,16 +1540,11 @@
             <p:ph type="sldImg"/>
           </p:nvPr>
         </p:nvSpPr>
-        <p:spPr>
-          <a:xfrm>
-            <a:off x="1143000" y="685800"/>
-            <a:ext cx="4572000" cy="3429000"/>
-          </a:xfrm>
-        </p:spPr>
+        <p:spPr/>
       </p:sp>
       <p:sp>
         <p:nvSpPr>
-          <p:cNvPr id="3" name="Symbol zastępczy notatek 2"/>
+          <p:cNvPr id="3" name="Notes Placeholder 2"/>
           <p:cNvSpPr>
             <a:spLocks noGrp="1"/>
           </p:cNvSpPr>
@@ -1003,18 +1557,104 @@
           <a:bodyPr/>
           <a:lstStyle/>
           <a:p>
+            <a:r>
+              <a:rPr lang="en-GB" dirty="0" err="1"/>
+              <a:t>Bawie</a:t>
+            </a:r>
+            <a:r>
+              <a:rPr lang="en-GB" dirty="0"/>
+              <a:t> </a:t>
+            </a:r>
+            <a:r>
+              <a:rPr lang="en-GB" dirty="0" err="1"/>
+              <a:t>sie</a:t>
+            </a:r>
+            <a:r>
+              <a:rPr lang="en-GB" dirty="0"/>
+              <a:t> </a:t>
+            </a:r>
+            <a:r>
+              <a:rPr lang="en-GB" dirty="0" err="1"/>
+              <a:t>chmura</a:t>
+            </a:r>
+            <a:r>
+              <a:rPr lang="en-GB" dirty="0"/>
+              <a:t> , </a:t>
+            </a:r>
+          </a:p>
+          <a:p>
+            <a:r>
+              <a:rPr lang="en-GB" dirty="0" err="1"/>
+              <a:t>Dostalem</a:t>
+            </a:r>
+            <a:r>
+              <a:rPr lang="en-GB" dirty="0"/>
+              <a:t> </a:t>
+            </a:r>
+            <a:r>
+              <a:rPr lang="en-GB" dirty="0" err="1"/>
+              <a:t>gadzet</a:t>
+            </a:r>
+            <a:r>
+              <a:rPr lang="en-GB" dirty="0"/>
+              <a:t> I </a:t>
+            </a:r>
+            <a:r>
+              <a:rPr lang="en-GB" dirty="0" err="1"/>
+              <a:t>teraz</a:t>
+            </a:r>
+            <a:r>
+              <a:rPr lang="en-GB" dirty="0"/>
+              <a:t> </a:t>
+            </a:r>
+            <a:r>
+              <a:rPr lang="en-GB" dirty="0" err="1"/>
+              <a:t>bedziemy</a:t>
+            </a:r>
+            <a:r>
+              <a:rPr lang="en-GB" dirty="0"/>
+              <a:t> </a:t>
+            </a:r>
+            <a:r>
+              <a:rPr lang="en-GB" dirty="0" err="1"/>
+              <a:t>mogli</a:t>
+            </a:r>
+            <a:r>
+              <a:rPr lang="en-GB" dirty="0"/>
+              <a:t> </a:t>
+            </a:r>
+            <a:r>
+              <a:rPr lang="en-GB" dirty="0" err="1"/>
+              <a:t>pobawic</a:t>
+            </a:r>
+            <a:r>
+              <a:rPr lang="en-GB" dirty="0"/>
+              <a:t> </a:t>
+            </a:r>
+            <a:r>
+              <a:rPr lang="en-GB" dirty="0" err="1"/>
+              <a:t>sie</a:t>
+            </a:r>
+            <a:r>
+              <a:rPr lang="en-GB" dirty="0"/>
+              <a:t> </a:t>
+            </a:r>
+            <a:r>
+              <a:rPr lang="en-GB"/>
+              <a:t>razem</a:t>
+            </a:r>
             <a:endParaRPr lang="pl-PL"/>
           </a:p>
         </p:txBody>
       </p:sp>
       <p:sp>
         <p:nvSpPr>
-          <p:cNvPr id="4" name="Symbol zastępczy numeru slajdu 3"/>
+          <p:cNvPr id="4" name="Slide Number Placeholder 3"/>
           <p:cNvSpPr>
             <a:spLocks noGrp="1"/>
           </p:cNvSpPr>
           <p:nvPr>
-            <p:ph type="sldNum" sz="quarter" idx="10"/>
+            <p:ph type="sldNum" sz="quarter" idx="5"/>
           </p:nvPr>
         </p:nvSpPr>
         <p:spPr/>
@@ -1025,7 +1665,7 @@
             <a:fld id="{CE9B941C-C958-4D16-B65B-3FFA13E93F71}" type="slidenum">
               <a:rPr lang="en-US" smtClean="0"/>
               <a:pPr/>
-              <a:t>33</a:t>
+              <a:t>4</a:t>
             </a:fld>
             <a:endParaRPr lang="en-US" dirty="0"/>
           </a:p>
@@ -1034,7 +1674,476 @@
     </p:spTree>
     <p:extLst>
       <p:ext uri="{BB962C8B-B14F-4D97-AF65-F5344CB8AC3E}">
-        <p14:creationId xmlns:p14="http://schemas.microsoft.com/office/powerpoint/2010/main" val="4248993471"/>
+        <p14:creationId xmlns:p14="http://schemas.microsoft.com/office/powerpoint/2010/main" val="1603044151"/>
+      </p:ext>
+    </p:extLst>
+  </p:cSld>
+  <p:clrMapOvr>
+    <a:masterClrMapping/>
+  </p:clrMapOvr>
+</p:notes>
+</file>
+
+<file path=ppt/notesSlides/notesSlide5.xml><?xml version="1.0" encoding="utf-8"?>
+<p:notes xmlns:a="http://schemas.openxmlformats.org/drawingml/2006/main" xmlns:r="http://schemas.openxmlformats.org/officeDocument/2006/relationships" xmlns:p="http://schemas.openxmlformats.org/presentationml/2006/main">
+  <p:cSld>
+    <p:spTree>
+      <p:nvGrpSpPr>
+        <p:cNvPr id="1" name=""/>
+        <p:cNvGrpSpPr/>
+        <p:nvPr/>
+      </p:nvGrpSpPr>
+      <p:grpSpPr>
+        <a:xfrm>
+          <a:off x="0" y="0"/>
+          <a:ext cx="0" cy="0"/>
+          <a:chOff x="0" y="0"/>
+          <a:chExt cx="0" cy="0"/>
+        </a:xfrm>
+      </p:grpSpPr>
+      <p:sp>
+        <p:nvSpPr>
+          <p:cNvPr id="2" name="Slide Image Placeholder 1"/>
+          <p:cNvSpPr>
+            <a:spLocks noGrp="1" noRot="1" noChangeAspect="1"/>
+          </p:cNvSpPr>
+          <p:nvPr>
+            <p:ph type="sldImg"/>
+          </p:nvPr>
+        </p:nvSpPr>
+        <p:spPr/>
+      </p:sp>
+      <p:sp>
+        <p:nvSpPr>
+          <p:cNvPr id="3" name="Notes Placeholder 2"/>
+          <p:cNvSpPr>
+            <a:spLocks noGrp="1"/>
+          </p:cNvSpPr>
+          <p:nvPr>
+            <p:ph type="body" idx="1"/>
+          </p:nvPr>
+        </p:nvSpPr>
+        <p:spPr/>
+        <p:txBody>
+          <a:bodyPr/>
+          <a:lstStyle/>
+          <a:p>
+            <a:r>
+              <a:rPr lang="en-GB" dirty="0" err="1"/>
+              <a:t>Poglądowy</a:t>
+            </a:r>
+            <a:r>
+              <a:rPr lang="en-GB" dirty="0"/>
+              <a:t> </a:t>
+            </a:r>
+            <a:r>
+              <a:rPr lang="en-GB" dirty="0" err="1"/>
+              <a:t>scenariusz</a:t>
+            </a:r>
+            <a:r>
+              <a:rPr lang="en-GB" dirty="0"/>
+              <a:t> </a:t>
+            </a:r>
+            <a:r>
+              <a:rPr lang="en-GB" dirty="0">
+                <a:sym typeface="Wingdings" panose="05000000000000000000" pitchFamily="2" charset="2"/>
+              </a:rPr>
+              <a:t></a:t>
+            </a:r>
+            <a:endParaRPr lang="pl-PL" dirty="0"/>
+          </a:p>
+        </p:txBody>
+      </p:sp>
+      <p:sp>
+        <p:nvSpPr>
+          <p:cNvPr id="4" name="Slide Number Placeholder 3"/>
+          <p:cNvSpPr>
+            <a:spLocks noGrp="1"/>
+          </p:cNvSpPr>
+          <p:nvPr>
+            <p:ph type="sldNum" sz="quarter" idx="5"/>
+          </p:nvPr>
+        </p:nvSpPr>
+        <p:spPr/>
+        <p:txBody>
+          <a:bodyPr/>
+          <a:lstStyle/>
+          <a:p>
+            <a:fld id="{CE9B941C-C958-4D16-B65B-3FFA13E93F71}" type="slidenum">
+              <a:rPr lang="en-US" smtClean="0"/>
+              <a:pPr/>
+              <a:t>9</a:t>
+            </a:fld>
+            <a:endParaRPr lang="en-US" dirty="0"/>
+          </a:p>
+        </p:txBody>
+      </p:sp>
+    </p:spTree>
+    <p:extLst>
+      <p:ext uri="{BB962C8B-B14F-4D97-AF65-F5344CB8AC3E}">
+        <p14:creationId xmlns:p14="http://schemas.microsoft.com/office/powerpoint/2010/main" val="346096444"/>
+      </p:ext>
+    </p:extLst>
+  </p:cSld>
+  <p:clrMapOvr>
+    <a:masterClrMapping/>
+  </p:clrMapOvr>
+</p:notes>
+</file>
+
+<file path=ppt/notesSlides/notesSlide6.xml><?xml version="1.0" encoding="utf-8"?>
+<p:notes xmlns:a="http://schemas.openxmlformats.org/drawingml/2006/main" xmlns:r="http://schemas.openxmlformats.org/officeDocument/2006/relationships" xmlns:p="http://schemas.openxmlformats.org/presentationml/2006/main">
+  <p:cSld>
+    <p:spTree>
+      <p:nvGrpSpPr>
+        <p:cNvPr id="1" name=""/>
+        <p:cNvGrpSpPr/>
+        <p:nvPr/>
+      </p:nvGrpSpPr>
+      <p:grpSpPr>
+        <a:xfrm>
+          <a:off x="0" y="0"/>
+          <a:ext cx="0" cy="0"/>
+          <a:chOff x="0" y="0"/>
+          <a:chExt cx="0" cy="0"/>
+        </a:xfrm>
+      </p:grpSpPr>
+      <p:sp>
+        <p:nvSpPr>
+          <p:cNvPr id="2" name="Slide Image Placeholder 1"/>
+          <p:cNvSpPr>
+            <a:spLocks noGrp="1" noRot="1" noChangeAspect="1"/>
+          </p:cNvSpPr>
+          <p:nvPr>
+            <p:ph type="sldImg"/>
+          </p:nvPr>
+        </p:nvSpPr>
+        <p:spPr/>
+      </p:sp>
+      <p:sp>
+        <p:nvSpPr>
+          <p:cNvPr id="3" name="Notes Placeholder 2"/>
+          <p:cNvSpPr>
+            <a:spLocks noGrp="1"/>
+          </p:cNvSpPr>
+          <p:nvPr>
+            <p:ph type="body" idx="1"/>
+          </p:nvPr>
+        </p:nvSpPr>
+        <p:spPr/>
+        <p:txBody>
+          <a:bodyPr/>
+          <a:lstStyle/>
+          <a:p>
+            <a:r>
+              <a:rPr lang="en-GB" dirty="0"/>
+              <a:t>Schema on read/ map data as a table</a:t>
+            </a:r>
+            <a:endParaRPr lang="pl-PL" dirty="0"/>
+          </a:p>
+        </p:txBody>
+      </p:sp>
+      <p:sp>
+        <p:nvSpPr>
+          <p:cNvPr id="4" name="Slide Number Placeholder 3"/>
+          <p:cNvSpPr>
+            <a:spLocks noGrp="1"/>
+          </p:cNvSpPr>
+          <p:nvPr>
+            <p:ph type="sldNum" sz="quarter" idx="5"/>
+          </p:nvPr>
+        </p:nvSpPr>
+        <p:spPr/>
+        <p:txBody>
+          <a:bodyPr/>
+          <a:lstStyle/>
+          <a:p>
+            <a:fld id="{CE9B941C-C958-4D16-B65B-3FFA13E93F71}" type="slidenum">
+              <a:rPr lang="en-US" smtClean="0"/>
+              <a:pPr/>
+              <a:t>14</a:t>
+            </a:fld>
+            <a:endParaRPr lang="en-US" dirty="0"/>
+          </a:p>
+        </p:txBody>
+      </p:sp>
+    </p:spTree>
+    <p:extLst>
+      <p:ext uri="{BB962C8B-B14F-4D97-AF65-F5344CB8AC3E}">
+        <p14:creationId xmlns:p14="http://schemas.microsoft.com/office/powerpoint/2010/main" val="2309908025"/>
+      </p:ext>
+    </p:extLst>
+  </p:cSld>
+  <p:clrMapOvr>
+    <a:masterClrMapping/>
+  </p:clrMapOvr>
+</p:notes>
+</file>
+
+<file path=ppt/notesSlides/notesSlide7.xml><?xml version="1.0" encoding="utf-8"?>
+<p:notes xmlns:a="http://schemas.openxmlformats.org/drawingml/2006/main" xmlns:r="http://schemas.openxmlformats.org/officeDocument/2006/relationships" xmlns:p="http://schemas.openxmlformats.org/presentationml/2006/main">
+  <p:cSld>
+    <p:spTree>
+      <p:nvGrpSpPr>
+        <p:cNvPr id="1" name=""/>
+        <p:cNvGrpSpPr/>
+        <p:nvPr/>
+      </p:nvGrpSpPr>
+      <p:grpSpPr>
+        <a:xfrm>
+          <a:off x="0" y="0"/>
+          <a:ext cx="0" cy="0"/>
+          <a:chOff x="0" y="0"/>
+          <a:chExt cx="0" cy="0"/>
+        </a:xfrm>
+      </p:grpSpPr>
+      <p:sp>
+        <p:nvSpPr>
+          <p:cNvPr id="2" name="Slide Image Placeholder 1"/>
+          <p:cNvSpPr>
+            <a:spLocks noGrp="1" noRot="1" noChangeAspect="1"/>
+          </p:cNvSpPr>
+          <p:nvPr>
+            <p:ph type="sldImg"/>
+          </p:nvPr>
+        </p:nvSpPr>
+        <p:spPr/>
+      </p:sp>
+      <p:sp>
+        <p:nvSpPr>
+          <p:cNvPr id="3" name="Notes Placeholder 2"/>
+          <p:cNvSpPr>
+            <a:spLocks noGrp="1"/>
+          </p:cNvSpPr>
+          <p:nvPr>
+            <p:ph type="body" idx="1"/>
+          </p:nvPr>
+        </p:nvSpPr>
+        <p:spPr/>
+        <p:txBody>
+          <a:bodyPr/>
+          <a:lstStyle/>
+          <a:p>
+            <a:r>
+              <a:rPr lang="en-GB" dirty="0"/>
+              <a:t>Lambda architecture/kappa</a:t>
+            </a:r>
+            <a:endParaRPr lang="pl-PL" dirty="0"/>
+          </a:p>
+        </p:txBody>
+      </p:sp>
+      <p:sp>
+        <p:nvSpPr>
+          <p:cNvPr id="4" name="Slide Number Placeholder 3"/>
+          <p:cNvSpPr>
+            <a:spLocks noGrp="1"/>
+          </p:cNvSpPr>
+          <p:nvPr>
+            <p:ph type="sldNum" sz="quarter" idx="5"/>
+          </p:nvPr>
+        </p:nvSpPr>
+        <p:spPr/>
+        <p:txBody>
+          <a:bodyPr/>
+          <a:lstStyle/>
+          <a:p>
+            <a:fld id="{CE9B941C-C958-4D16-B65B-3FFA13E93F71}" type="slidenum">
+              <a:rPr lang="en-US" smtClean="0"/>
+              <a:pPr/>
+              <a:t>16</a:t>
+            </a:fld>
+            <a:endParaRPr lang="en-US" dirty="0"/>
+          </a:p>
+        </p:txBody>
+      </p:sp>
+    </p:spTree>
+    <p:extLst>
+      <p:ext uri="{BB962C8B-B14F-4D97-AF65-F5344CB8AC3E}">
+        <p14:creationId xmlns:p14="http://schemas.microsoft.com/office/powerpoint/2010/main" val="2071141159"/>
+      </p:ext>
+    </p:extLst>
+  </p:cSld>
+  <p:clrMapOvr>
+    <a:masterClrMapping/>
+  </p:clrMapOvr>
+</p:notes>
+</file>
+
+<file path=ppt/notesSlides/notesSlide8.xml><?xml version="1.0" encoding="utf-8"?>
+<p:notes xmlns:a="http://schemas.openxmlformats.org/drawingml/2006/main" xmlns:r="http://schemas.openxmlformats.org/officeDocument/2006/relationships" xmlns:p="http://schemas.openxmlformats.org/presentationml/2006/main">
+  <p:cSld>
+    <p:spTree>
+      <p:nvGrpSpPr>
+        <p:cNvPr id="1" name=""/>
+        <p:cNvGrpSpPr/>
+        <p:nvPr/>
+      </p:nvGrpSpPr>
+      <p:grpSpPr>
+        <a:xfrm>
+          <a:off x="0" y="0"/>
+          <a:ext cx="0" cy="0"/>
+          <a:chOff x="0" y="0"/>
+          <a:chExt cx="0" cy="0"/>
+        </a:xfrm>
+      </p:grpSpPr>
+      <p:sp>
+        <p:nvSpPr>
+          <p:cNvPr id="2" name="Slide Image Placeholder 1"/>
+          <p:cNvSpPr>
+            <a:spLocks noGrp="1" noRot="1" noChangeAspect="1"/>
+          </p:cNvSpPr>
+          <p:nvPr>
+            <p:ph type="sldImg"/>
+          </p:nvPr>
+        </p:nvSpPr>
+        <p:spPr/>
+      </p:sp>
+      <p:sp>
+        <p:nvSpPr>
+          <p:cNvPr id="3" name="Notes Placeholder 2"/>
+          <p:cNvSpPr>
+            <a:spLocks noGrp="1"/>
+          </p:cNvSpPr>
+          <p:nvPr>
+            <p:ph type="body" idx="1"/>
+          </p:nvPr>
+        </p:nvSpPr>
+        <p:spPr/>
+        <p:txBody>
+          <a:bodyPr/>
+          <a:lstStyle/>
+          <a:p>
+            <a:r>
+              <a:rPr lang="en-GB" dirty="0"/>
+              <a:t>Back to out problem –how to partition data?</a:t>
+            </a:r>
+          </a:p>
+          <a:p>
+            <a:r>
+              <a:rPr lang="en-GB" dirty="0"/>
+              <a:t>ADLA</a:t>
+            </a:r>
+            <a:endParaRPr lang="pl-PL" dirty="0"/>
+          </a:p>
+        </p:txBody>
+      </p:sp>
+      <p:sp>
+        <p:nvSpPr>
+          <p:cNvPr id="4" name="Slide Number Placeholder 3"/>
+          <p:cNvSpPr>
+            <a:spLocks noGrp="1"/>
+          </p:cNvSpPr>
+          <p:nvPr>
+            <p:ph type="sldNum" sz="quarter" idx="5"/>
+          </p:nvPr>
+        </p:nvSpPr>
+        <p:spPr/>
+        <p:txBody>
+          <a:bodyPr/>
+          <a:lstStyle/>
+          <a:p>
+            <a:fld id="{CE9B941C-C958-4D16-B65B-3FFA13E93F71}" type="slidenum">
+              <a:rPr lang="en-US" smtClean="0"/>
+              <a:pPr/>
+              <a:t>17</a:t>
+            </a:fld>
+            <a:endParaRPr lang="en-US" dirty="0"/>
+          </a:p>
+        </p:txBody>
+      </p:sp>
+    </p:spTree>
+    <p:extLst>
+      <p:ext uri="{BB962C8B-B14F-4D97-AF65-F5344CB8AC3E}">
+        <p14:creationId xmlns:p14="http://schemas.microsoft.com/office/powerpoint/2010/main" val="471833269"/>
+      </p:ext>
+    </p:extLst>
+  </p:cSld>
+  <p:clrMapOvr>
+    <a:masterClrMapping/>
+  </p:clrMapOvr>
+</p:notes>
+</file>
+
+<file path=ppt/notesSlides/notesSlide9.xml><?xml version="1.0" encoding="utf-8"?>
+<p:notes xmlns:a="http://schemas.openxmlformats.org/drawingml/2006/main" xmlns:r="http://schemas.openxmlformats.org/officeDocument/2006/relationships" xmlns:p="http://schemas.openxmlformats.org/presentationml/2006/main">
+  <p:cSld>
+    <p:spTree>
+      <p:nvGrpSpPr>
+        <p:cNvPr id="1" name=""/>
+        <p:cNvGrpSpPr/>
+        <p:nvPr/>
+      </p:nvGrpSpPr>
+      <p:grpSpPr>
+        <a:xfrm>
+          <a:off x="0" y="0"/>
+          <a:ext cx="0" cy="0"/>
+          <a:chOff x="0" y="0"/>
+          <a:chExt cx="0" cy="0"/>
+        </a:xfrm>
+      </p:grpSpPr>
+      <p:sp>
+        <p:nvSpPr>
+          <p:cNvPr id="2" name="Slide Image Placeholder 1"/>
+          <p:cNvSpPr>
+            <a:spLocks noGrp="1" noRot="1" noChangeAspect="1"/>
+          </p:cNvSpPr>
+          <p:nvPr>
+            <p:ph type="sldImg"/>
+          </p:nvPr>
+        </p:nvSpPr>
+        <p:spPr/>
+      </p:sp>
+      <p:sp>
+        <p:nvSpPr>
+          <p:cNvPr id="3" name="Notes Placeholder 2"/>
+          <p:cNvSpPr>
+            <a:spLocks noGrp="1"/>
+          </p:cNvSpPr>
+          <p:nvPr>
+            <p:ph type="body" idx="1"/>
+          </p:nvPr>
+        </p:nvSpPr>
+        <p:spPr/>
+        <p:txBody>
+          <a:bodyPr/>
+          <a:lstStyle/>
+          <a:p>
+            <a:r>
+              <a:rPr lang="en-GB" dirty="0"/>
+              <a:t>How get access to partitioned data</a:t>
+            </a:r>
+            <a:endParaRPr lang="pl-PL" dirty="0"/>
+          </a:p>
+        </p:txBody>
+      </p:sp>
+      <p:sp>
+        <p:nvSpPr>
+          <p:cNvPr id="4" name="Slide Number Placeholder 3"/>
+          <p:cNvSpPr>
+            <a:spLocks noGrp="1"/>
+          </p:cNvSpPr>
+          <p:nvPr>
+            <p:ph type="sldNum" sz="quarter" idx="5"/>
+          </p:nvPr>
+        </p:nvSpPr>
+        <p:spPr/>
+        <p:txBody>
+          <a:bodyPr/>
+          <a:lstStyle/>
+          <a:p>
+            <a:fld id="{CE9B941C-C958-4D16-B65B-3FFA13E93F71}" type="slidenum">
+              <a:rPr lang="en-US" smtClean="0"/>
+              <a:pPr/>
+              <a:t>19</a:t>
+            </a:fld>
+            <a:endParaRPr lang="en-US" dirty="0"/>
+          </a:p>
+        </p:txBody>
+      </p:sp>
+    </p:spTree>
+    <p:extLst>
+      <p:ext uri="{BB962C8B-B14F-4D97-AF65-F5344CB8AC3E}">
+        <p14:creationId xmlns:p14="http://schemas.microsoft.com/office/powerpoint/2010/main" val="2481279218"/>
       </p:ext>
     </p:extLst>
   </p:cSld>
@@ -6947,7 +8056,7 @@
                   </a:schemeClr>
                 </a:solidFill>
               </a:rPr>
-              <a:t>U-SQL </a:t>
+              <a:t>U-SQL Job/Query</a:t>
             </a:r>
           </a:p>
           <a:p>
@@ -6964,7 +8073,7 @@
                   </a:schemeClr>
                 </a:solidFill>
               </a:rPr>
-              <a:t>Job HQL </a:t>
+              <a:t>HQL Job </a:t>
             </a:r>
           </a:p>
           <a:p>
@@ -9092,7 +10201,7 @@
                 </a:solidFill>
                 <a:latin typeface="Consolas" panose="020B0609020204030204" pitchFamily="49" charset="0"/>
               </a:rPr>
-              <a:t>StreetCrimesParitioned</a:t>
+              <a:t>StreetCrimes</a:t>
             </a:r>
             <a:endParaRPr lang="en-US" sz="1600" dirty="0">
               <a:solidFill>
@@ -9530,7 +10639,7 @@
           <p:nvPr/>
         </p:nvPicPr>
         <p:blipFill>
-          <a:blip r:embed="rId2"/>
+          <a:blip r:embed="rId3"/>
           <a:stretch>
             <a:fillRect/>
           </a:stretch>
@@ -9560,7 +10669,7 @@
           <p:nvPr/>
         </p:nvPicPr>
         <p:blipFill>
-          <a:blip r:embed="rId3"/>
+          <a:blip r:embed="rId4"/>
           <a:stretch>
             <a:fillRect/>
           </a:stretch>
@@ -10256,7 +11365,7 @@
         <p:spPr>
           <a:xfrm>
             <a:off x="1043611" y="5661462"/>
-            <a:ext cx="5282215" cy="461665"/>
+            <a:ext cx="5791970" cy="461665"/>
           </a:xfrm>
           <a:prstGeom prst="rect">
             <a:avLst/>
@@ -10269,13 +11378,13 @@
           <a:lstStyle/>
           <a:p>
             <a:r>
-              <a:rPr lang="en-GB" sz="2400" b="1" dirty="0" err="1">
+              <a:rPr lang="en-GB" sz="2400" b="1" dirty="0">
                 <a:solidFill>
                   <a:srgbClr val="FF5F00"/>
                 </a:solidFill>
                 <a:latin typeface="Consolas" panose="020B0609020204030204" pitchFamily="49" charset="0"/>
               </a:rPr>
-              <a:t>PartitionKey</a:t>
+              <a:t>{Partition Key}</a:t>
             </a:r>
             <a:r>
               <a:rPr lang="pl-PL" sz="2400" b="1" dirty="0">
@@ -10326,7 +11435,7 @@
         </p:nvSpPr>
         <p:spPr>
           <a:xfrm>
-            <a:off x="626370" y="1741646"/>
+            <a:off x="602434" y="1581103"/>
             <a:ext cx="7704353" cy="830997"/>
           </a:xfrm>
           <a:prstGeom prst="rect">
@@ -10358,17 +11467,18 @@
                   </a:schemeClr>
                 </a:solidFill>
               </a:rPr>
-              <a:t> is a way of dividing a table into related </a:t>
+              <a:t> </a:t>
             </a:r>
             <a:r>
               <a:rPr lang="pl-PL" sz="2400" b="1" dirty="0">
                 <a:solidFill>
-                  <a:schemeClr val="accent6">
-                    <a:lumMod val="75000"/>
+                  <a:schemeClr val="tx1">
+                    <a:lumMod val="65000"/>
+                    <a:lumOff val="35000"/>
                   </a:schemeClr>
                 </a:solidFill>
               </a:rPr>
-              <a:t>parts</a:t>
+              <a:t>is a way of dividing a table into related</a:t>
             </a:r>
             <a:r>
               <a:rPr lang="pl-PL" sz="2400" b="1" dirty="0">
@@ -10379,10 +11489,20 @@
                   </a:schemeClr>
                 </a:solidFill>
               </a:rPr>
-              <a:t> based on the values of partitioned columns</a:t>
-            </a:r>
-            <a:r>
-              <a:rPr lang="en-GB" sz="2400" b="1" dirty="0">
+              <a:t> </a:t>
+            </a:r>
+            <a:r>
+              <a:rPr lang="pl-PL" sz="2400" b="1" dirty="0">
+                <a:solidFill>
+                  <a:schemeClr val="accent6">
+                    <a:lumMod val="75000"/>
+                  </a:schemeClr>
+                </a:solidFill>
+              </a:rPr>
+              <a:t>parts</a:t>
+            </a:r>
+            <a:r>
+              <a:rPr lang="pl-PL" sz="2400" b="1" dirty="0">
                 <a:solidFill>
                   <a:schemeClr val="tx1">
                     <a:lumMod val="75000"/>
@@ -10390,13 +11510,35 @@
                   </a:schemeClr>
                 </a:solidFill>
               </a:rPr>
+              <a:t> </a:t>
+            </a:r>
+            <a:r>
+              <a:rPr lang="pl-PL" sz="2400" b="1" dirty="0">
+                <a:solidFill>
+                  <a:schemeClr val="tx1">
+                    <a:lumMod val="65000"/>
+                    <a:lumOff val="35000"/>
+                  </a:schemeClr>
+                </a:solidFill>
+              </a:rPr>
+              <a:t>based on the values of partitioned columns</a:t>
+            </a:r>
+            <a:r>
+              <a:rPr lang="en-GB" sz="2400" b="1" dirty="0">
+                <a:solidFill>
+                  <a:schemeClr val="tx1">
+                    <a:lumMod val="65000"/>
+                    <a:lumOff val="35000"/>
+                  </a:schemeClr>
+                </a:solidFill>
+              </a:rPr>
               <a:t>.</a:t>
             </a:r>
             <a:endParaRPr lang="pl-PL" sz="2400" b="1" dirty="0">
               <a:solidFill>
                 <a:schemeClr val="tx1">
-                  <a:lumMod val="75000"/>
-                  <a:lumOff val="25000"/>
+                  <a:lumMod val="65000"/>
+                  <a:lumOff val="35000"/>
                 </a:schemeClr>
               </a:solidFill>
             </a:endParaRPr>
@@ -10418,7 +11560,7 @@
           <p:nvPr/>
         </p:nvPicPr>
         <p:blipFill>
-          <a:blip r:embed="rId2"/>
+          <a:blip r:embed="rId3"/>
           <a:stretch>
             <a:fillRect/>
           </a:stretch>
@@ -10447,7 +11589,7 @@
         </p:nvGrpSpPr>
         <p:grpSpPr>
           <a:xfrm>
-            <a:off x="2915816" y="4987329"/>
+            <a:off x="1516981" y="5169079"/>
             <a:ext cx="3595984" cy="461665"/>
             <a:chOff x="4317117" y="3723786"/>
             <a:chExt cx="3595984" cy="461665"/>
@@ -10592,7 +11734,7 @@
         </p:nvGrpSpPr>
         <p:grpSpPr>
           <a:xfrm>
-            <a:off x="2913991" y="3719434"/>
+            <a:off x="1516981" y="3783533"/>
             <a:ext cx="3595984" cy="461665"/>
             <a:chOff x="4284257" y="3015941"/>
             <a:chExt cx="3595984" cy="461665"/>
@@ -10723,6 +11865,134 @@
           </p:style>
         </p:cxnSp>
       </p:grpSp>
+      <p:sp>
+        <p:nvSpPr>
+          <p:cNvPr id="3" name="TextBox 2">
+            <a:extLst>
+              <a:ext uri="{FF2B5EF4-FFF2-40B4-BE49-F238E27FC236}">
+                <a16:creationId xmlns:a16="http://schemas.microsoft.com/office/drawing/2014/main" id="{61749583-14F0-4289-97EC-4CB39C5C14B6}"/>
+              </a:ext>
+            </a:extLst>
+          </p:cNvPr>
+          <p:cNvSpPr txBox="1"/>
+          <p:nvPr/>
+        </p:nvSpPr>
+        <p:spPr>
+          <a:xfrm>
+            <a:off x="5700519" y="2810569"/>
+            <a:ext cx="3201261" cy="1754326"/>
+          </a:xfrm>
+          <a:prstGeom prst="rect">
+            <a:avLst/>
+          </a:prstGeom>
+          <a:noFill/>
+        </p:spPr>
+        <p:txBody>
+          <a:bodyPr wrap="none" rtlCol="0">
+            <a:spAutoFit/>
+          </a:bodyPr>
+          <a:lstStyle/>
+          <a:p>
+            <a:pPr marL="285750" indent="-285750">
+              <a:buFont typeface="Arial" panose="020B0604020202020204" pitchFamily="34" charset="0"/>
+              <a:buChar char="•"/>
+            </a:pPr>
+            <a:r>
+              <a:rPr lang="en-GB" b="1" dirty="0">
+                <a:solidFill>
+                  <a:schemeClr val="accent6">
+                    <a:lumMod val="75000"/>
+                  </a:schemeClr>
+                </a:solidFill>
+              </a:rPr>
+              <a:t>Azure Event Hub </a:t>
+            </a:r>
+          </a:p>
+          <a:p>
+            <a:pPr marL="742950" lvl="1" indent="-285750">
+              <a:buFont typeface="Arial" panose="020B0604020202020204" pitchFamily="34" charset="0"/>
+              <a:buChar char="•"/>
+            </a:pPr>
+            <a:r>
+              <a:rPr lang="en-GB" b="1" dirty="0">
+                <a:solidFill>
+                  <a:schemeClr val="tx1">
+                    <a:lumMod val="65000"/>
+                    <a:lumOff val="35000"/>
+                  </a:schemeClr>
+                </a:solidFill>
+              </a:rPr>
+              <a:t>(Event data capturing)</a:t>
+            </a:r>
+          </a:p>
+          <a:p>
+            <a:pPr marL="285750" indent="-285750">
+              <a:buFont typeface="Arial" panose="020B0604020202020204" pitchFamily="34" charset="0"/>
+              <a:buChar char="•"/>
+            </a:pPr>
+            <a:r>
+              <a:rPr lang="en-GB" b="1" dirty="0">
+                <a:solidFill>
+                  <a:schemeClr val="accent6">
+                    <a:lumMod val="75000"/>
+                  </a:schemeClr>
+                </a:solidFill>
+              </a:rPr>
+              <a:t>Azure Stream Analytics </a:t>
+            </a:r>
+          </a:p>
+          <a:p>
+            <a:pPr marL="742950" lvl="1" indent="-285750">
+              <a:buFont typeface="Arial" panose="020B0604020202020204" pitchFamily="34" charset="0"/>
+              <a:buChar char="•"/>
+            </a:pPr>
+            <a:r>
+              <a:rPr lang="en-GB" b="1" dirty="0">
+                <a:solidFill>
+                  <a:schemeClr val="tx1">
+                    <a:lumMod val="65000"/>
+                    <a:lumOff val="35000"/>
+                  </a:schemeClr>
+                </a:solidFill>
+              </a:rPr>
+              <a:t>(Output)</a:t>
+            </a:r>
+          </a:p>
+          <a:p>
+            <a:pPr marL="285750" indent="-285750">
+              <a:buFont typeface="Arial" panose="020B0604020202020204" pitchFamily="34" charset="0"/>
+              <a:buChar char="•"/>
+            </a:pPr>
+            <a:r>
+              <a:rPr lang="en-GB" b="1" dirty="0">
+                <a:solidFill>
+                  <a:schemeClr val="accent6">
+                    <a:lumMod val="75000"/>
+                  </a:schemeClr>
+                </a:solidFill>
+              </a:rPr>
+              <a:t>Azure Data Factory</a:t>
+            </a:r>
+          </a:p>
+          <a:p>
+            <a:pPr marL="742950" lvl="1" indent="-285750">
+              <a:buFont typeface="Arial" panose="020B0604020202020204" pitchFamily="34" charset="0"/>
+              <a:buChar char="•"/>
+            </a:pPr>
+            <a:r>
+              <a:rPr lang="en-GB" b="1" dirty="0">
+                <a:solidFill>
+                  <a:schemeClr val="tx1">
+                    <a:lumMod val="65000"/>
+                    <a:lumOff val="35000"/>
+                  </a:schemeClr>
+                </a:solidFill>
+              </a:rPr>
+              <a:t>Load into Azure Storage</a:t>
+            </a:r>
+          </a:p>
+        </p:txBody>
+      </p:sp>
     </p:spTree>
     <p:extLst>
       <p:ext uri="{BB962C8B-B14F-4D97-AF65-F5344CB8AC3E}">
@@ -11247,7 +12517,7 @@
           <p:nvPr/>
         </p:nvPicPr>
         <p:blipFill>
-          <a:blip r:embed="rId2"/>
+          <a:blip r:embed="rId3"/>
           <a:stretch>
             <a:fillRect/>
           </a:stretch>
@@ -11277,7 +12547,7 @@
           <p:nvPr/>
         </p:nvPicPr>
         <p:blipFill>
-          <a:blip r:embed="rId3"/>
+          <a:blip r:embed="rId4"/>
           <a:stretch>
             <a:fillRect/>
           </a:stretch>
@@ -11486,6 +12756,46 @@
               </a:rPr>
               <a:t>ADLA- Read Partitioned Data</a:t>
             </a:r>
+            <a:r>
+              <a:rPr lang="en-GB" dirty="0">
+                <a:solidFill>
+                  <a:schemeClr val="tx1">
+                    <a:lumMod val="65000"/>
+                    <a:lumOff val="35000"/>
+                  </a:schemeClr>
+                </a:solidFill>
+              </a:rPr>
+              <a:t> </a:t>
+            </a:r>
+            <a:br>
+              <a:rPr lang="en-GB" dirty="0">
+                <a:solidFill>
+                  <a:schemeClr val="tx1">
+                    <a:lumMod val="65000"/>
+                    <a:lumOff val="35000"/>
+                  </a:schemeClr>
+                </a:solidFill>
+              </a:rPr>
+            </a:br>
+            <a:r>
+              <a:rPr lang="en-GB" dirty="0">
+                <a:solidFill>
+                  <a:schemeClr val="tx1">
+                    <a:lumMod val="65000"/>
+                    <a:lumOff val="35000"/>
+                  </a:schemeClr>
+                </a:solidFill>
+              </a:rPr>
+              <a:t>(Partition Elimination)</a:t>
+            </a:r>
+            <a:endParaRPr lang="pl-PL" dirty="0">
+              <a:solidFill>
+                <a:schemeClr val="tx1">
+                  <a:lumMod val="65000"/>
+                  <a:lumOff val="35000"/>
+                </a:schemeClr>
+              </a:solidFill>
+            </a:endParaRPr>
           </a:p>
         </p:txBody>
       </p:sp>
@@ -11503,8 +12813,8 @@
         </p:nvSpPr>
         <p:spPr>
           <a:xfrm>
-            <a:off x="395536" y="1417641"/>
-            <a:ext cx="8640960" cy="584775"/>
+            <a:off x="0" y="1385964"/>
+            <a:ext cx="7812360" cy="338554"/>
           </a:xfrm>
           <a:prstGeom prst="rect">
             <a:avLst/>
@@ -11577,45 +12887,16 @@
                 </a:solidFill>
                 <a:latin typeface="Consolas" panose="020B0609020204030204" pitchFamily="49" charset="0"/>
               </a:rPr>
-              <a:t> = </a:t>
-            </a:r>
-          </a:p>
-          <a:p>
+              <a:t> =</a:t>
+            </a:r>
             <a:r>
               <a:rPr lang="en-US" sz="1600" dirty="0">
                 <a:solidFill>
-                  <a:srgbClr val="000000"/>
-                </a:solidFill>
-                <a:latin typeface="Consolas" panose="020B0609020204030204" pitchFamily="49" charset="0"/>
-              </a:rPr>
-              <a:t>		</a:t>
-            </a:r>
-            <a:r>
-              <a:rPr lang="en-US" sz="1600" dirty="0">
-                <a:solidFill>
                   <a:srgbClr val="A05000"/>
                 </a:solidFill>
                 <a:latin typeface="Consolas" panose="020B0609020204030204" pitchFamily="49" charset="0"/>
               </a:rPr>
-              <a:t>@"</a:t>
-            </a:r>
-            <a:r>
-              <a:rPr lang="en-US" sz="1600" dirty="0" err="1">
-                <a:solidFill>
-                  <a:srgbClr val="A05000"/>
-                </a:solidFill>
-                <a:latin typeface="Consolas" panose="020B0609020204030204" pitchFamily="49" charset="0"/>
-              </a:rPr>
-              <a:t>PartitionedData</a:t>
-            </a:r>
-            <a:r>
-              <a:rPr lang="en-US" sz="1600" dirty="0">
-                <a:solidFill>
-                  <a:srgbClr val="A05000"/>
-                </a:solidFill>
-                <a:latin typeface="Consolas" panose="020B0609020204030204" pitchFamily="49" charset="0"/>
-              </a:rPr>
-              <a:t>/year={</a:t>
+              <a:t>@“../year={</a:t>
             </a:r>
             <a:r>
               <a:rPr lang="en-US" sz="1600" b="1" dirty="0">
@@ -11687,8 +12968,8 @@
         </p:blipFill>
         <p:spPr>
           <a:xfrm>
-            <a:off x="5880589" y="3601482"/>
-            <a:ext cx="2962579" cy="2593331"/>
+            <a:off x="5880589" y="3988655"/>
+            <a:ext cx="2520279" cy="2206158"/>
           </a:xfrm>
           <a:prstGeom prst="rect">
             <a:avLst/>
@@ -11717,8 +12998,8 @@
         </p:blipFill>
         <p:spPr>
           <a:xfrm>
-            <a:off x="899593" y="3601482"/>
-            <a:ext cx="2920644" cy="2593331"/>
+            <a:off x="899593" y="3956978"/>
+            <a:ext cx="2520279" cy="2237835"/>
           </a:xfrm>
           <a:prstGeom prst="rect">
             <a:avLst/>
@@ -11739,7 +13020,7 @@
         </p:nvSpPr>
         <p:spPr>
           <a:xfrm>
-            <a:off x="5004048" y="2331105"/>
+            <a:off x="5156583" y="2879760"/>
             <a:ext cx="4032448" cy="1077218"/>
           </a:xfrm>
           <a:prstGeom prst="rect">
@@ -11982,7 +13263,7 @@
         </p:nvSpPr>
         <p:spPr>
           <a:xfrm>
-            <a:off x="547936" y="2284265"/>
+            <a:off x="457200" y="2875002"/>
             <a:ext cx="4032448" cy="1107996"/>
           </a:xfrm>
           <a:prstGeom prst="rect">
@@ -12282,6 +13563,338 @@
               </a:rPr>
               <a:t>;</a:t>
             </a:r>
+          </a:p>
+        </p:txBody>
+      </p:sp>
+      <p:sp>
+        <p:nvSpPr>
+          <p:cNvPr id="3" name="Rectangle 2">
+            <a:extLst>
+              <a:ext uri="{FF2B5EF4-FFF2-40B4-BE49-F238E27FC236}">
+                <a16:creationId xmlns:a16="http://schemas.microsoft.com/office/drawing/2014/main" id="{CDACE37B-34C9-42DE-A820-72A0ADC2A1B6}"/>
+              </a:ext>
+            </a:extLst>
+          </p:cNvPr>
+          <p:cNvSpPr/>
+          <p:nvPr/>
+        </p:nvSpPr>
+        <p:spPr>
+          <a:xfrm>
+            <a:off x="395536" y="1756195"/>
+            <a:ext cx="2592288" cy="1077218"/>
+          </a:xfrm>
+          <a:prstGeom prst="rect">
+            <a:avLst/>
+          </a:prstGeom>
+        </p:spPr>
+        <p:txBody>
+          <a:bodyPr wrap="square">
+            <a:spAutoFit/>
+          </a:bodyPr>
+          <a:lstStyle/>
+          <a:p>
+            <a:r>
+              <a:rPr lang="pl-PL" sz="1600" dirty="0">
+                <a:solidFill>
+                  <a:srgbClr val="505000"/>
+                </a:solidFill>
+                <a:latin typeface="Consolas" panose="020B0609020204030204" pitchFamily="49" charset="0"/>
+              </a:rPr>
+              <a:t>@inputData </a:t>
+            </a:r>
+            <a:r>
+              <a:rPr lang="pl-PL" sz="1600" dirty="0">
+                <a:solidFill>
+                  <a:srgbClr val="000000"/>
+                </a:solidFill>
+                <a:latin typeface="Consolas" panose="020B0609020204030204" pitchFamily="49" charset="0"/>
+              </a:rPr>
+              <a:t>=</a:t>
+            </a:r>
+          </a:p>
+          <a:p>
+            <a:r>
+              <a:rPr lang="pl-PL" sz="1600" dirty="0">
+                <a:solidFill>
+                  <a:srgbClr val="0000FF"/>
+                </a:solidFill>
+                <a:latin typeface="Consolas" panose="020B0609020204030204" pitchFamily="49" charset="0"/>
+              </a:rPr>
+              <a:t>EXTRACT</a:t>
+            </a:r>
+            <a:r>
+              <a:rPr lang="en-GB" sz="1600" dirty="0">
+                <a:solidFill>
+                  <a:srgbClr val="0000FF"/>
+                </a:solidFill>
+                <a:latin typeface="Consolas" panose="020B0609020204030204" pitchFamily="49" charset="0"/>
+              </a:rPr>
+              <a:t>…</a:t>
+            </a:r>
+            <a:r>
+              <a:rPr lang="pl-PL" sz="1600" dirty="0">
+                <a:solidFill>
+                  <a:srgbClr val="000000"/>
+                </a:solidFill>
+                <a:latin typeface="Consolas" panose="020B0609020204030204" pitchFamily="49" charset="0"/>
+              </a:rPr>
+              <a:t> </a:t>
+            </a:r>
+            <a:endParaRPr lang="en-GB" sz="1600" dirty="0">
+              <a:solidFill>
+                <a:srgbClr val="000000"/>
+              </a:solidFill>
+              <a:latin typeface="Consolas" panose="020B0609020204030204" pitchFamily="49" charset="0"/>
+            </a:endParaRPr>
+          </a:p>
+          <a:p>
+            <a:r>
+              <a:rPr lang="en-GB" sz="1600" dirty="0">
+                <a:solidFill>
+                  <a:srgbClr val="000000"/>
+                </a:solidFill>
+                <a:latin typeface="Consolas" panose="020B0609020204030204" pitchFamily="49" charset="0"/>
+              </a:rPr>
+              <a:t>	</a:t>
+            </a:r>
+            <a:r>
+              <a:rPr lang="pl-PL" sz="1600" dirty="0">
+                <a:solidFill>
+                  <a:srgbClr val="000000"/>
+                </a:solidFill>
+                <a:latin typeface="Consolas" panose="020B0609020204030204" pitchFamily="49" charset="0"/>
+              </a:rPr>
+              <a:t>Year </a:t>
+            </a:r>
+            <a:r>
+              <a:rPr lang="pl-PL" sz="1600" dirty="0">
+                <a:solidFill>
+                  <a:srgbClr val="0000FF"/>
+                </a:solidFill>
+                <a:latin typeface="Consolas" panose="020B0609020204030204" pitchFamily="49" charset="0"/>
+              </a:rPr>
+              <a:t>string</a:t>
+            </a:r>
+            <a:r>
+              <a:rPr lang="pl-PL" sz="1600" dirty="0">
+                <a:solidFill>
+                  <a:srgbClr val="000000"/>
+                </a:solidFill>
+                <a:latin typeface="Consolas" panose="020B0609020204030204" pitchFamily="49" charset="0"/>
+              </a:rPr>
+              <a:t>,</a:t>
+            </a:r>
+          </a:p>
+          <a:p>
+            <a:r>
+              <a:rPr lang="en-GB" sz="1600" dirty="0">
+                <a:solidFill>
+                  <a:srgbClr val="000000"/>
+                </a:solidFill>
+                <a:latin typeface="Consolas" panose="020B0609020204030204" pitchFamily="49" charset="0"/>
+              </a:rPr>
+              <a:t>	</a:t>
+            </a:r>
+            <a:r>
+              <a:rPr lang="pl-PL" sz="1600" dirty="0">
+                <a:solidFill>
+                  <a:srgbClr val="000000"/>
+                </a:solidFill>
+                <a:latin typeface="Consolas" panose="020B0609020204030204" pitchFamily="49" charset="0"/>
+              </a:rPr>
+              <a:t>Month </a:t>
+            </a:r>
+            <a:r>
+              <a:rPr lang="pl-PL" sz="1600" dirty="0">
+                <a:solidFill>
+                  <a:srgbClr val="0000FF"/>
+                </a:solidFill>
+                <a:latin typeface="Consolas" panose="020B0609020204030204" pitchFamily="49" charset="0"/>
+              </a:rPr>
+              <a:t>string</a:t>
+            </a:r>
+            <a:r>
+              <a:rPr lang="en-GB" sz="1600" dirty="0">
+                <a:solidFill>
+                  <a:srgbClr val="0000FF"/>
+                </a:solidFill>
+                <a:latin typeface="Consolas" panose="020B0609020204030204" pitchFamily="49" charset="0"/>
+              </a:rPr>
+              <a:t>;</a:t>
+            </a:r>
+            <a:endParaRPr lang="pl-PL" sz="1600" b="0" dirty="0">
+              <a:solidFill>
+                <a:srgbClr val="000000"/>
+              </a:solidFill>
+              <a:effectLst/>
+              <a:latin typeface="Consolas" panose="020B0609020204030204" pitchFamily="49" charset="0"/>
+            </a:endParaRPr>
+          </a:p>
+        </p:txBody>
+      </p:sp>
+      <p:sp>
+        <p:nvSpPr>
+          <p:cNvPr id="9" name="Rectangle 8">
+            <a:extLst>
+              <a:ext uri="{FF2B5EF4-FFF2-40B4-BE49-F238E27FC236}">
+                <a16:creationId xmlns:a16="http://schemas.microsoft.com/office/drawing/2014/main" id="{60A50B9F-E20D-4DF5-8B29-64CE8E21F1A8}"/>
+              </a:ext>
+            </a:extLst>
+          </p:cNvPr>
+          <p:cNvSpPr/>
+          <p:nvPr/>
+        </p:nvSpPr>
+        <p:spPr>
+          <a:xfrm>
+            <a:off x="4932040" y="1802934"/>
+            <a:ext cx="2592288" cy="1077218"/>
+          </a:xfrm>
+          <a:prstGeom prst="rect">
+            <a:avLst/>
+          </a:prstGeom>
+        </p:spPr>
+        <p:txBody>
+          <a:bodyPr wrap="square">
+            <a:spAutoFit/>
+          </a:bodyPr>
+          <a:lstStyle/>
+          <a:p>
+            <a:r>
+              <a:rPr lang="pl-PL" sz="1600" dirty="0">
+                <a:solidFill>
+                  <a:srgbClr val="505000"/>
+                </a:solidFill>
+                <a:latin typeface="Consolas" panose="020B0609020204030204" pitchFamily="49" charset="0"/>
+              </a:rPr>
+              <a:t>@inputData </a:t>
+            </a:r>
+            <a:r>
+              <a:rPr lang="pl-PL" sz="1600" dirty="0">
+                <a:solidFill>
+                  <a:srgbClr val="000000"/>
+                </a:solidFill>
+                <a:latin typeface="Consolas" panose="020B0609020204030204" pitchFamily="49" charset="0"/>
+              </a:rPr>
+              <a:t>=</a:t>
+            </a:r>
+          </a:p>
+          <a:p>
+            <a:r>
+              <a:rPr lang="pl-PL" sz="1600" dirty="0">
+                <a:solidFill>
+                  <a:srgbClr val="0000FF"/>
+                </a:solidFill>
+                <a:latin typeface="Consolas" panose="020B0609020204030204" pitchFamily="49" charset="0"/>
+              </a:rPr>
+              <a:t>EXTRACT</a:t>
+            </a:r>
+            <a:r>
+              <a:rPr lang="en-GB" sz="1600" dirty="0">
+                <a:solidFill>
+                  <a:srgbClr val="0000FF"/>
+                </a:solidFill>
+                <a:latin typeface="Consolas" panose="020B0609020204030204" pitchFamily="49" charset="0"/>
+              </a:rPr>
+              <a:t>…</a:t>
+            </a:r>
+            <a:r>
+              <a:rPr lang="pl-PL" sz="1600" dirty="0">
+                <a:solidFill>
+                  <a:srgbClr val="000000"/>
+                </a:solidFill>
+                <a:latin typeface="Consolas" panose="020B0609020204030204" pitchFamily="49" charset="0"/>
+              </a:rPr>
+              <a:t> </a:t>
+            </a:r>
+            <a:endParaRPr lang="en-GB" sz="1600" dirty="0">
+              <a:solidFill>
+                <a:srgbClr val="000000"/>
+              </a:solidFill>
+              <a:latin typeface="Consolas" panose="020B0609020204030204" pitchFamily="49" charset="0"/>
+            </a:endParaRPr>
+          </a:p>
+          <a:p>
+            <a:r>
+              <a:rPr lang="en-GB" sz="1600" dirty="0">
+                <a:solidFill>
+                  <a:srgbClr val="000000"/>
+                </a:solidFill>
+                <a:latin typeface="Consolas" panose="020B0609020204030204" pitchFamily="49" charset="0"/>
+              </a:rPr>
+              <a:t>	</a:t>
+            </a:r>
+            <a:r>
+              <a:rPr lang="pl-PL" sz="1600" dirty="0">
+                <a:solidFill>
+                  <a:srgbClr val="000000"/>
+                </a:solidFill>
+                <a:latin typeface="Consolas" panose="020B0609020204030204" pitchFamily="49" charset="0"/>
+              </a:rPr>
+              <a:t>Year </a:t>
+            </a:r>
+            <a:r>
+              <a:rPr lang="en-GB" sz="1600" dirty="0">
+                <a:solidFill>
+                  <a:srgbClr val="0000FF"/>
+                </a:solidFill>
+                <a:latin typeface="Consolas" panose="020B0609020204030204" pitchFamily="49" charset="0"/>
+              </a:rPr>
+              <a:t>int</a:t>
+            </a:r>
+            <a:r>
+              <a:rPr lang="pl-PL" sz="1600" dirty="0">
+                <a:solidFill>
+                  <a:srgbClr val="000000"/>
+                </a:solidFill>
+                <a:latin typeface="Consolas" panose="020B0609020204030204" pitchFamily="49" charset="0"/>
+              </a:rPr>
+              <a:t>,</a:t>
+            </a:r>
+          </a:p>
+          <a:p>
+            <a:r>
+              <a:rPr lang="en-GB" sz="1600" dirty="0">
+                <a:solidFill>
+                  <a:srgbClr val="000000"/>
+                </a:solidFill>
+                <a:latin typeface="Consolas" panose="020B0609020204030204" pitchFamily="49" charset="0"/>
+              </a:rPr>
+              <a:t>	</a:t>
+            </a:r>
+            <a:r>
+              <a:rPr lang="pl-PL" sz="1600" dirty="0">
+                <a:solidFill>
+                  <a:srgbClr val="000000"/>
+                </a:solidFill>
+                <a:latin typeface="Consolas" panose="020B0609020204030204" pitchFamily="49" charset="0"/>
+              </a:rPr>
+              <a:t>Month</a:t>
+            </a:r>
+            <a:r>
+              <a:rPr lang="en-GB" sz="1600" dirty="0">
+                <a:solidFill>
+                  <a:srgbClr val="000000"/>
+                </a:solidFill>
+                <a:latin typeface="Consolas" panose="020B0609020204030204" pitchFamily="49" charset="0"/>
+              </a:rPr>
+              <a:t> </a:t>
+            </a:r>
+            <a:r>
+              <a:rPr lang="en-GB" sz="1600" dirty="0">
+                <a:solidFill>
+                  <a:srgbClr val="0000FF"/>
+                </a:solidFill>
+                <a:latin typeface="Consolas" panose="020B0609020204030204" pitchFamily="49" charset="0"/>
+              </a:rPr>
+              <a:t>int;</a:t>
+            </a:r>
+            <a:endParaRPr lang="pl-PL" sz="1600" b="0" dirty="0">
+              <a:solidFill>
+                <a:srgbClr val="000000"/>
+              </a:solidFill>
+              <a:effectLst/>
+              <a:latin typeface="Consolas" panose="020B0609020204030204" pitchFamily="49" charset="0"/>
+            </a:endParaRPr>
           </a:p>
         </p:txBody>
       </p:sp>
@@ -12393,7 +14006,7 @@
                 </a:solidFill>
                 <a:latin typeface="Consolas" panose="020B0609020204030204" pitchFamily="49" charset="0"/>
               </a:rPr>
-              <a:t>CREATE</a:t>
+              <a:t>CREATE EXTERNAL</a:t>
             </a:r>
             <a:r>
               <a:rPr lang="en-US" sz="1600" dirty="0">
@@ -12760,7 +14373,7 @@
                 </a:solidFill>
                 <a:latin typeface="Consolas" panose="020B0609020204030204" pitchFamily="49" charset="0"/>
               </a:rPr>
-              <a:t>CREATE TABLE</a:t>
+              <a:t>CREATE EXTERNAL TABLE</a:t>
             </a:r>
             <a:r>
               <a:rPr lang="en-US" sz="1600" dirty="0">
@@ -13474,7 +15087,7 @@
           <p:nvPr/>
         </p:nvPicPr>
         <p:blipFill>
-          <a:blip r:embed="rId2">
+          <a:blip r:embed="rId3">
             <a:extLst>
               <a:ext uri="{28A0092B-C50C-407E-A947-70E740481C1C}">
                 <a14:useLocalDpi xmlns:a14="http://schemas.microsoft.com/office/drawing/2010/main" val="0"/>
@@ -13521,7 +15134,7 @@
           <p:nvPr/>
         </p:nvPicPr>
         <p:blipFill>
-          <a:blip r:embed="rId3">
+          <a:blip r:embed="rId4">
             <a:extLst>
               <a:ext uri="{28A0092B-C50C-407E-A947-70E740481C1C}">
                 <a14:useLocalDpi xmlns:a14="http://schemas.microsoft.com/office/drawing/2010/main" val="0"/>
@@ -13746,6 +15359,17 @@
           <a:lstStyle/>
           <a:p>
             <a:r>
+              <a:rPr lang="en-GB" sz="4000" spc="300" dirty="0" err="1">
+                <a:solidFill>
+                  <a:schemeClr val="accent6">
+                    <a:lumMod val="75000"/>
+                  </a:schemeClr>
+                </a:solidFill>
+                <a:latin typeface="Malleable-FP" panose="00000500000000000000" pitchFamily="50" charset="0"/>
+              </a:rPr>
+              <a:t>Partycjonowanie</a:t>
+            </a:r>
+            <a:r>
               <a:rPr lang="en-GB" sz="4000" spc="300" dirty="0">
                 <a:solidFill>
                   <a:schemeClr val="tx1">
@@ -13755,39 +15379,10 @@
                 </a:solidFill>
                 <a:latin typeface="Malleable-FP" panose="00000500000000000000" pitchFamily="50" charset="0"/>
               </a:rPr>
-              <a:t>Data</a:t>
-            </a:r>
-            <a:r>
-              <a:rPr lang="en-GB" sz="4000" spc="300" dirty="0">
-                <a:solidFill>
-                  <a:srgbClr val="FF5F00"/>
-                </a:solidFill>
-                <a:latin typeface="Malleable-FP" panose="00000500000000000000" pitchFamily="50" charset="0"/>
-              </a:rPr>
               <a:t> </a:t>
             </a:r>
             <a:r>
-              <a:rPr lang="en-GB" sz="4000" spc="300" dirty="0">
-                <a:solidFill>
-                  <a:schemeClr val="accent6">
-                    <a:lumMod val="75000"/>
-                  </a:schemeClr>
-                </a:solidFill>
-                <a:latin typeface="Malleable-FP" panose="00000500000000000000" pitchFamily="50" charset="0"/>
-              </a:rPr>
-              <a:t>Partitioning</a:t>
-            </a:r>
-            <a:r>
-              <a:rPr lang="en-GB" sz="4000" spc="300" dirty="0">
-                <a:solidFill>
-                  <a:srgbClr val="FF5F00"/>
-                </a:solidFill>
-                <a:latin typeface="Malleable-FP" panose="00000500000000000000" pitchFamily="50" charset="0"/>
-              </a:rPr>
-              <a:t> </a:t>
-            </a:r>
-            <a:r>
-              <a:rPr lang="en-GB" sz="4000" spc="300" dirty="0">
+              <a:rPr lang="en-GB" sz="4000" spc="300" dirty="0" err="1">
                 <a:solidFill>
                   <a:schemeClr val="tx1">
                     <a:lumMod val="75000"/>
@@ -13796,27 +15391,7 @@
                 </a:solidFill>
                 <a:latin typeface="Malleable-FP" panose="00000500000000000000" pitchFamily="50" charset="0"/>
               </a:rPr>
-              <a:t>in</a:t>
-            </a:r>
-            <a:r>
-              <a:rPr lang="en-GB" sz="4000" spc="300" dirty="0">
-                <a:solidFill>
-                  <a:srgbClr val="FF5F00"/>
-                </a:solidFill>
-                <a:latin typeface="Malleable-FP" panose="00000500000000000000" pitchFamily="50" charset="0"/>
-              </a:rPr>
-              <a:t> </a:t>
-            </a:r>
-            <a:r>
-              <a:rPr lang="en-GB" sz="4000" spc="300" dirty="0">
-                <a:solidFill>
-                  <a:schemeClr val="accent6">
-                    <a:lumMod val="75000"/>
-                  </a:schemeClr>
-                </a:solidFill>
-                <a:latin typeface="Malleable-FP" panose="00000500000000000000" pitchFamily="50" charset="0"/>
-              </a:rPr>
-              <a:t>Big Data </a:t>
+              <a:t>danych</a:t>
             </a:r>
             <a:r>
               <a:rPr lang="en-GB" sz="4000" spc="300" dirty="0">
@@ -13828,7 +15403,65 @@
                 </a:solidFill>
                 <a:latin typeface="Malleable-FP" panose="00000500000000000000" pitchFamily="50" charset="0"/>
               </a:rPr>
-              <a:t>Solutions</a:t>
+              <a:t> </a:t>
+            </a:r>
+            <a:br>
+              <a:rPr lang="pl-PL" sz="4000" spc="300" dirty="0">
+                <a:solidFill>
+                  <a:schemeClr val="tx1">
+                    <a:lumMod val="75000"/>
+                    <a:lumOff val="25000"/>
+                  </a:schemeClr>
+                </a:solidFill>
+                <a:latin typeface="Malleable-FP" panose="00000500000000000000" pitchFamily="50" charset="0"/>
+              </a:rPr>
+            </a:br>
+            <a:r>
+              <a:rPr lang="en-GB" sz="4000" spc="300" dirty="0">
+                <a:solidFill>
+                  <a:schemeClr val="tx1">
+                    <a:lumMod val="75000"/>
+                    <a:lumOff val="25000"/>
+                  </a:schemeClr>
+                </a:solidFill>
+                <a:latin typeface="Malleable-FP" panose="00000500000000000000" pitchFamily="50" charset="0"/>
+              </a:rPr>
+              <a:t>w </a:t>
+            </a:r>
+            <a:r>
+              <a:rPr lang="en-GB" sz="4000" spc="300" dirty="0" err="1">
+                <a:solidFill>
+                  <a:schemeClr val="tx1">
+                    <a:lumMod val="75000"/>
+                    <a:lumOff val="25000"/>
+                  </a:schemeClr>
+                </a:solidFill>
+                <a:latin typeface="Malleable-FP" panose="00000500000000000000" pitchFamily="50" charset="0"/>
+              </a:rPr>
+              <a:t>rozwiązaniach</a:t>
+            </a:r>
+            <a:r>
+              <a:rPr lang="en-GB" sz="4000" spc="300" dirty="0">
+                <a:solidFill>
+                  <a:schemeClr val="tx1">
+                    <a:lumMod val="75000"/>
+                    <a:lumOff val="25000"/>
+                  </a:schemeClr>
+                </a:solidFill>
+                <a:latin typeface="Malleable-FP" panose="00000500000000000000" pitchFamily="50" charset="0"/>
+              </a:rPr>
+              <a:t> </a:t>
+            </a:r>
+            <a:r>
+              <a:rPr lang="en-GB" sz="4000" spc="300" dirty="0">
+                <a:solidFill>
+                  <a:schemeClr val="accent6">
+                    <a:lumMod val="75000"/>
+                  </a:schemeClr>
+                </a:solidFill>
+                <a:latin typeface="Malleable-FP" panose="00000500000000000000" pitchFamily="50" charset="0"/>
+              </a:rPr>
+              <a:t>Big Data</a:t>
             </a:r>
           </a:p>
         </p:txBody>
@@ -13843,7 +15476,12 @@
             <p:ph type="subTitle" idx="1"/>
           </p:nvPr>
         </p:nvSpPr>
-        <p:spPr/>
+        <p:spPr>
+          <a:xfrm>
+            <a:off x="1475656" y="4176788"/>
+            <a:ext cx="6400800" cy="1752600"/>
+          </a:xfrm>
+        </p:spPr>
         <p:txBody>
           <a:bodyPr>
             <a:normAutofit/>
@@ -13863,14 +15501,17 @@
             </a:r>
           </a:p>
           <a:p>
-            <a:endParaRPr lang="en-GB" sz="2800" dirty="0">
-              <a:solidFill>
-                <a:schemeClr val="tx1">
-                  <a:lumMod val="75000"/>
-                  <a:lumOff val="25000"/>
-                </a:schemeClr>
-              </a:solidFill>
-            </a:endParaRPr>
+            <a:r>
+              <a:rPr lang="en-GB" sz="2000" dirty="0">
+                <a:solidFill>
+                  <a:schemeClr val="tx1">
+                    <a:lumMod val="75000"/>
+                    <a:lumOff val="25000"/>
+                  </a:schemeClr>
+                </a:solidFill>
+              </a:rPr>
+              <a:t>tkrawczyk@future-processing.com</a:t>
+            </a:r>
           </a:p>
         </p:txBody>
       </p:sp>
@@ -13896,7 +15537,7 @@
         </p:blipFill>
         <p:spPr>
           <a:xfrm>
-            <a:off x="3306580" y="4755604"/>
+            <a:off x="3410636" y="5229200"/>
             <a:ext cx="2530839" cy="297484"/>
           </a:xfrm>
           <a:prstGeom prst="rect">
@@ -15978,10 +17619,24 @@
           <a:lstStyle/>
           <a:p>
             <a:r>
-              <a:rPr lang="en-GB" dirty="0"/>
+              <a:rPr lang="en-GB" dirty="0">
+                <a:solidFill>
+                  <a:schemeClr val="tx1">
+                    <a:lumMod val="75000"/>
+                    <a:lumOff val="25000"/>
+                  </a:schemeClr>
+                </a:solidFill>
+              </a:rPr>
               <a:t>Challenge</a:t>
             </a:r>
-            <a:endParaRPr lang="pl-PL" dirty="0"/>
+            <a:endParaRPr lang="pl-PL" dirty="0">
+              <a:solidFill>
+                <a:schemeClr val="tx1">
+                  <a:lumMod val="75000"/>
+                  <a:lumOff val="25000"/>
+                </a:schemeClr>
+              </a:solidFill>
+            </a:endParaRPr>
           </a:p>
         </p:txBody>
       </p:sp>
@@ -18673,10 +20328,24 @@
           <a:lstStyle/>
           <a:p>
             <a:r>
-              <a:rPr lang="en-GB" dirty="0"/>
+              <a:rPr lang="en-GB" dirty="0">
+                <a:solidFill>
+                  <a:schemeClr val="tx1">
+                    <a:lumMod val="75000"/>
+                    <a:lumOff val="25000"/>
+                  </a:schemeClr>
+                </a:solidFill>
+              </a:rPr>
               <a:t>ADLA Tables, Partitioning and bucketing </a:t>
             </a:r>
-            <a:endParaRPr lang="pl-PL" dirty="0"/>
+            <a:endParaRPr lang="pl-PL" dirty="0">
+              <a:solidFill>
+                <a:schemeClr val="tx1">
+                  <a:lumMod val="75000"/>
+                  <a:lumOff val="25000"/>
+                </a:schemeClr>
+              </a:solidFill>
+            </a:endParaRPr>
           </a:p>
         </p:txBody>
       </p:sp>
@@ -19276,11 +20945,20 @@
         </p:nvSpPr>
         <p:spPr/>
         <p:txBody>
-          <a:bodyPr/>
+          <a:bodyPr>
+            <a:normAutofit/>
+          </a:bodyPr>
           <a:lstStyle/>
           <a:p>
             <a:r>
-              <a:rPr lang="pl-PL" dirty="0"/>
+              <a:rPr lang="pl-PL" dirty="0">
+                <a:solidFill>
+                  <a:schemeClr val="tx1">
+                    <a:lumMod val="75000"/>
+                    <a:lumOff val="25000"/>
+                  </a:schemeClr>
+                </a:solidFill>
+              </a:rPr>
               <a:t>Delta Lake </a:t>
             </a:r>
           </a:p>
@@ -19301,7 +20979,7 @@
           <p:nvPr/>
         </p:nvPicPr>
         <p:blipFill>
-          <a:blip r:embed="rId2" cstate="print">
+          <a:blip r:embed="rId3" cstate="print">
             <a:extLst>
               <a:ext uri="{28A0092B-C50C-407E-A947-70E740481C1C}">
                 <a14:useLocalDpi xmlns:a14="http://schemas.microsoft.com/office/drawing/2010/main" val="0"/>
@@ -19315,7 +20993,7 @@
         </p:blipFill>
         <p:spPr bwMode="auto">
           <a:xfrm>
-            <a:off x="3126442" y="2829463"/>
+            <a:off x="3143502" y="2821019"/>
             <a:ext cx="6018551" cy="2568436"/>
           </a:xfrm>
           <a:prstGeom prst="rect">
@@ -19362,7 +21040,7 @@
           <a:p>
             <a:r>
               <a:rPr lang="pl-PL" sz="2000" dirty="0">
-                <a:hlinkClick r:id="rId3"/>
+                <a:hlinkClick r:id="rId4"/>
               </a:rPr>
               <a:t>https://delta.io/</a:t>
             </a:r>
@@ -19451,8 +21129,8 @@
         </p:nvSpPr>
         <p:spPr>
           <a:xfrm>
-            <a:off x="107505" y="3089575"/>
-            <a:ext cx="3493235" cy="2308324"/>
+            <a:off x="32454" y="3089574"/>
+            <a:ext cx="3493235" cy="2031325"/>
           </a:xfrm>
           <a:prstGeom prst="rect">
             <a:avLst/>
@@ -19524,24 +21202,7 @@
                   </a:schemeClr>
                 </a:solidFill>
               </a:rPr>
-              <a:t>Unified Streaming </a:t>
-            </a:r>
-          </a:p>
-          <a:p>
-            <a:pPr marL="285744" indent="-285744">
-              <a:buFont typeface="Arial" panose="020B0604020202020204" pitchFamily="34" charset="0"/>
-              <a:buChar char="•"/>
-            </a:pPr>
-            <a:r>
-              <a:rPr lang="en-GB" b="1" dirty="0">
-                <a:solidFill>
-                  <a:schemeClr val="tx1">
-                    <a:lumMod val="75000"/>
-                    <a:lumOff val="25000"/>
-                  </a:schemeClr>
-                </a:solidFill>
-              </a:rPr>
-              <a:t>and Batch</a:t>
+              <a:t>Unified Streaming and Batch</a:t>
             </a:r>
           </a:p>
           <a:p>
@@ -19734,7 +21395,7 @@
         <p:spPr>
           <a:xfrm>
             <a:off x="4788024" y="1764908"/>
-            <a:ext cx="4608511" cy="2616101"/>
+            <a:ext cx="4608511" cy="2923877"/>
           </a:xfrm>
           <a:prstGeom prst="rect">
             <a:avLst/>
@@ -19807,6 +21468,44 @@
                 </a:solidFill>
               </a:rPr>
               <a:t>(multi-dimensional clustering)</a:t>
+            </a:r>
+          </a:p>
+          <a:p>
+            <a:pPr marL="1028686" lvl="1" indent="-571486">
+              <a:buFont typeface="Arial" panose="020B0604020202020204" pitchFamily="34" charset="0"/>
+              <a:buChar char="•"/>
+            </a:pPr>
+            <a:r>
+              <a:rPr lang="en-GB" sz="2000" dirty="0">
+                <a:solidFill>
+                  <a:schemeClr val="tx1">
+                    <a:lumMod val="75000"/>
+                    <a:lumOff val="25000"/>
+                  </a:schemeClr>
+                </a:solidFill>
+              </a:rPr>
+              <a:t>(</a:t>
+            </a:r>
+            <a:r>
+              <a:rPr lang="en-GB" sz="2000" b="1" dirty="0">
+                <a:solidFill>
+                  <a:schemeClr val="accent6">
+                    <a:lumMod val="75000"/>
+                  </a:schemeClr>
+                </a:solidFill>
+              </a:rPr>
+              <a:t>WHERE x=1 OR y=2</a:t>
+            </a:r>
+            <a:r>
+              <a:rPr lang="en-GB" sz="2000" dirty="0">
+                <a:solidFill>
+                  <a:schemeClr val="tx1">
+                    <a:lumMod val="75000"/>
+                    <a:lumOff val="25000"/>
+                  </a:schemeClr>
+                </a:solidFill>
+              </a:rPr>
+              <a:t>)</a:t>
             </a:r>
           </a:p>
           <a:p>
@@ -20369,7 +22068,14 @@
           <a:lstStyle/>
           <a:p>
             <a:r>
-              <a:rPr lang="pl-PL" dirty="0"/>
+              <a:rPr lang="pl-PL" dirty="0">
+                <a:solidFill>
+                  <a:schemeClr val="tx1">
+                    <a:lumMod val="65000"/>
+                    <a:lumOff val="35000"/>
+                  </a:schemeClr>
+                </a:solidFill>
+              </a:rPr>
               <a:t>About Me</a:t>
             </a:r>
             <a:br>
@@ -20491,7 +22197,7 @@
           <p:nvPr/>
         </p:nvPicPr>
         <p:blipFill>
-          <a:blip r:embed="rId2"/>
+          <a:blip r:embed="rId3"/>
           <a:stretch>
             <a:fillRect/>
           </a:stretch>
@@ -20521,7 +22227,7 @@
           <p:nvPr/>
         </p:nvPicPr>
         <p:blipFill>
-          <a:blip r:embed="rId3"/>
+          <a:blip r:embed="rId4"/>
           <a:stretch>
             <a:fillRect/>
           </a:stretch>
@@ -20551,7 +22257,7 @@
           <p:nvPr/>
         </p:nvPicPr>
         <p:blipFill>
-          <a:blip r:embed="rId4"/>
+          <a:blip r:embed="rId5"/>
           <a:stretch>
             <a:fillRect/>
           </a:stretch>
@@ -20612,7 +22318,12 @@
             <p:ph type="title"/>
           </p:nvPr>
         </p:nvSpPr>
-        <p:spPr/>
+        <p:spPr>
+          <a:xfrm>
+            <a:off x="897045" y="4567776"/>
+            <a:ext cx="7772400" cy="1362075"/>
+          </a:xfrm>
+        </p:spPr>
         <p:txBody>
           <a:bodyPr/>
           <a:lstStyle/>
@@ -20681,8 +22392,16 @@
                   </a:schemeClr>
                 </a:solidFill>
               </a:rPr>
-              <a:t>009-Delta</a:t>
-            </a:r>
+              <a:t>010-Delta</a:t>
+            </a:r>
+            <a:endParaRPr lang="pl-PL" sz="2400" dirty="0">
+              <a:solidFill>
+                <a:schemeClr val="tx1">
+                  <a:lumMod val="75000"/>
+                  <a:lumOff val="25000"/>
+                </a:schemeClr>
+              </a:solidFill>
+            </a:endParaRPr>
           </a:p>
         </p:txBody>
       </p:sp>
@@ -21106,7 +22825,7 @@
                   </a:schemeClr>
                 </a:solidFill>
               </a:rPr>
-              <a:t> Partitioning vs /and Bucketing</a:t>
+              <a:t> Partitioning vs /and Bucketing (Horizontal and Vertical Partitioning)</a:t>
             </a:r>
           </a:p>
           <a:p>
@@ -21245,7 +22964,7 @@
         <p:spPr>
           <a:xfrm>
             <a:off x="683568" y="1417640"/>
-            <a:ext cx="8064896" cy="4062651"/>
+            <a:ext cx="8064896" cy="4616648"/>
           </a:xfrm>
           <a:prstGeom prst="rect">
             <a:avLst/>
@@ -21326,14 +23045,14 @@
           </a:p>
           <a:p>
             <a:r>
-              <a:rPr lang="pl-PL" sz="2000" b="1" dirty="0">
+              <a:rPr lang="en-GB" sz="2000" b="1" dirty="0">
                 <a:solidFill>
                   <a:schemeClr val="accent6">
                     <a:lumMod val="75000"/>
                   </a:schemeClr>
                 </a:solidFill>
               </a:rPr>
-              <a:t>Blogs and pages</a:t>
+              <a:t>External resources</a:t>
             </a:r>
             <a:endParaRPr lang="pl-PL" sz="2000" dirty="0"/>
           </a:p>
@@ -21374,7 +23093,7 @@
               </a:rPr>
               <a:t>https://spark.apache.org/</a:t>
             </a:r>
-            <a:endParaRPr lang="pl-PL" dirty="0"/>
+            <a:endParaRPr lang="en-GB" dirty="0"/>
           </a:p>
           <a:p>
             <a:pPr marL="342891" indent="-342891">
@@ -21385,7 +23104,7 @@
               <a:rPr lang="pl-PL" dirty="0">
                 <a:hlinkClick r:id="rId8"/>
               </a:rPr>
-              <a:t>https://hive.apache.org/</a:t>
+              <a:t>https://jaceklaskowski.gitbooks.io/mastering-spark-sql/spark-sql-properties.html</a:t>
             </a:r>
             <a:endParaRPr lang="pl-PL" dirty="0"/>
           </a:p>
@@ -21398,7 +23117,7 @@
               <a:rPr lang="pl-PL" dirty="0">
                 <a:hlinkClick r:id="rId9"/>
               </a:rPr>
-              <a:t>http://usql.io</a:t>
+              <a:t>https://hive.apache.org/</a:t>
             </a:r>
             <a:endParaRPr lang="en-GB" dirty="0"/>
           </a:p>
@@ -21410,6 +23129,32 @@
             <a:r>
               <a:rPr lang="pl-PL" dirty="0">
                 <a:hlinkClick r:id="rId10"/>
+              </a:rPr>
+              <a:t>https://dotnet.microsoft.com/apps/data/spark</a:t>
+            </a:r>
+            <a:endParaRPr lang="pl-PL" dirty="0"/>
+          </a:p>
+          <a:p>
+            <a:pPr marL="342891" indent="-342891">
+              <a:buFont typeface="Arial" panose="020B0604020202020204" pitchFamily="34" charset="0"/>
+              <a:buChar char="•"/>
+            </a:pPr>
+            <a:r>
+              <a:rPr lang="pl-PL" dirty="0">
+                <a:hlinkClick r:id="rId11"/>
+              </a:rPr>
+              <a:t>http://usql.io</a:t>
+            </a:r>
+            <a:endParaRPr lang="en-GB" dirty="0"/>
+          </a:p>
+          <a:p>
+            <a:pPr marL="342891" indent="-342891">
+              <a:buFont typeface="Arial" panose="020B0604020202020204" pitchFamily="34" charset="0"/>
+              <a:buChar char="•"/>
+            </a:pPr>
+            <a:r>
+              <a:rPr lang="pl-PL" dirty="0">
+                <a:hlinkClick r:id="rId12"/>
               </a:rPr>
               <a:t>https://databricks.com/blog/2018/07/31/processing-petabytes-of-data-in-seconds-with-databricks-delta.html</a:t>
             </a:r>
@@ -22346,10 +24091,24 @@
           <a:lstStyle/>
           <a:p>
             <a:r>
-              <a:rPr lang="en-GB" dirty="0"/>
+              <a:rPr lang="en-GB" dirty="0">
+                <a:solidFill>
+                  <a:schemeClr val="tx1">
+                    <a:lumMod val="65000"/>
+                    <a:lumOff val="35000"/>
+                  </a:schemeClr>
+                </a:solidFill>
+              </a:rPr>
               <a:t>Project</a:t>
             </a:r>
-            <a:endParaRPr lang="pl-PL" dirty="0"/>
+            <a:endParaRPr lang="pl-PL" dirty="0">
+              <a:solidFill>
+                <a:schemeClr val="tx1">
+                  <a:lumMod val="65000"/>
+                  <a:lumOff val="35000"/>
+                </a:schemeClr>
+              </a:solidFill>
+            </a:endParaRPr>
           </a:p>
         </p:txBody>
       </p:sp>
@@ -22387,7 +24146,7 @@
                     <a:lumMod val="75000"/>
                   </a:schemeClr>
                 </a:solidFill>
-                <a:hlinkClick r:id="rId2">
+                <a:hlinkClick r:id="rId3">
                   <a:extLst>
                     <a:ext uri="{A12FA001-AC4F-418D-AE19-62706E023703}">
                       <ahyp:hlinkClr xmlns:ahyp="http://schemas.microsoft.com/office/drawing/2018/hyperlinkcolor" val="tx"/>
@@ -22422,7 +24181,7 @@
           <p:nvPr/>
         </p:nvPicPr>
         <p:blipFill>
-          <a:blip r:embed="rId3"/>
+          <a:blip r:embed="rId4"/>
           <a:stretch>
             <a:fillRect/>
           </a:stretch>
@@ -22452,7 +24211,7 @@
           <p:nvPr/>
         </p:nvPicPr>
         <p:blipFill>
-          <a:blip r:embed="rId4"/>
+          <a:blip r:embed="rId5"/>
           <a:stretch>
             <a:fillRect/>
           </a:stretch>
@@ -22553,12 +24312,12 @@
         <p:spPr>
           <a:xfrm>
             <a:off x="457200" y="1600208"/>
-            <a:ext cx="8229600" cy="3845019"/>
+            <a:ext cx="8229600" cy="3989032"/>
           </a:xfrm>
         </p:spPr>
         <p:txBody>
           <a:bodyPr>
-            <a:normAutofit/>
+            <a:normAutofit lnSpcReduction="10000"/>
           </a:bodyPr>
           <a:lstStyle/>
           <a:p>
@@ -22602,7 +24361,7 @@
                   </a:schemeClr>
                 </a:solidFill>
               </a:rPr>
-              <a:t>Big Data </a:t>
+              <a:t>Big Data Solutions </a:t>
             </a:r>
             <a:r>
               <a:rPr lang="en-GB" sz="2800" b="1" dirty="0">
@@ -22613,7 +24372,7 @@
                   </a:schemeClr>
                 </a:solidFill>
               </a:rPr>
-              <a:t>on Azure</a:t>
+              <a:t>(Azure)</a:t>
             </a:r>
           </a:p>
           <a:p>
@@ -22761,6 +24520,23 @@
                 </a:solidFill>
               </a:rPr>
               <a:t> and Delta Lake</a:t>
+            </a:r>
+          </a:p>
+          <a:p>
+            <a:pPr>
+              <a:buFont typeface="Wingdings" panose="05000000000000000000" pitchFamily="2" charset="2"/>
+              <a:buChar char="§"/>
+            </a:pPr>
+            <a:r>
+              <a:rPr lang="en-GB" sz="2800" b="1" dirty="0">
+                <a:solidFill>
+                  <a:schemeClr val="tx1">
+                    <a:lumMod val="65000"/>
+                    <a:lumOff val="35000"/>
+                  </a:schemeClr>
+                </a:solidFill>
+              </a:rPr>
+              <a:t>Demos</a:t>
             </a:r>
             <a:endParaRPr lang="en-GB" sz="2800" b="1" dirty="0">
               <a:solidFill>
@@ -23869,7 +25645,29 @@
                   </a:schemeClr>
                 </a:solidFill>
               </a:rPr>
-              <a:t>Big Data On Azure</a:t>
+              <a:t>Big Data </a:t>
+            </a:r>
+            <a:r>
+              <a:rPr lang="en-GB" dirty="0">
+                <a:solidFill>
+                  <a:schemeClr val="tx1">
+                    <a:lumMod val="65000"/>
+                    <a:lumOff val="35000"/>
+                  </a:schemeClr>
+                </a:solidFill>
+              </a:rPr>
+              <a:t> Solutions and</a:t>
+            </a:r>
+            <a:r>
+              <a:rPr lang="pl-PL" dirty="0">
+                <a:solidFill>
+                  <a:schemeClr val="tx1">
+                    <a:lumMod val="65000"/>
+                    <a:lumOff val="35000"/>
+                  </a:schemeClr>
+                </a:solidFill>
+              </a:rPr>
+              <a:t> Azure</a:t>
             </a:r>
           </a:p>
         </p:txBody>
@@ -26013,7 +27811,7 @@
             <p:nvPr/>
           </p:nvPicPr>
           <p:blipFill>
-            <a:blip r:embed="rId2"/>
+            <a:blip r:embed="rId3"/>
             <a:stretch>
               <a:fillRect/>
             </a:stretch>
@@ -26043,7 +27841,7 @@
             <p:nvPr/>
           </p:nvPicPr>
           <p:blipFill>
-            <a:blip r:embed="rId3" cstate="print">
+            <a:blip r:embed="rId4" cstate="print">
               <a:extLst>
                 <a:ext uri="{28A0092B-C50C-407E-A947-70E740481C1C}">
                   <a14:useLocalDpi xmlns:a14="http://schemas.microsoft.com/office/drawing/2010/main" val="0"/>
@@ -26080,7 +27878,7 @@
           <p:nvPr/>
         </p:nvPicPr>
         <p:blipFill>
-          <a:blip r:embed="rId4"/>
+          <a:blip r:embed="rId5"/>
           <a:stretch>
             <a:fillRect/>
           </a:stretch>
@@ -26240,7 +28038,7 @@
           <p:spPr>
             <a:xfrm>
               <a:off x="1294261" y="5706692"/>
-              <a:ext cx="927305" cy="400110"/>
+              <a:ext cx="2098908" cy="400110"/>
             </a:xfrm>
             <a:prstGeom prst="rect">
               <a:avLst/>
@@ -26260,7 +28058,7 @@
                     </a:schemeClr>
                   </a:solidFill>
                 </a:rPr>
-                <a:t>FILTER:</a:t>
+                <a:t>FILTER (PROCESS):</a:t>
               </a:r>
               <a:endParaRPr lang="pl-PL" b="1" dirty="0">
                 <a:solidFill>

</xml_diff>